<commit_message>
slides do 1 e 2 relatorio prontos
</commit_message>
<xml_diff>
--- a/ESOF-DOCS/Terasology.pptx
+++ b/ESOF-DOCS/Terasology.pptx
@@ -7,6 +7,7 @@
   <p:sldIdLst>
     <p:sldId id="256" r:id="rId2"/>
     <p:sldId id="257" r:id="rId3"/>
+    <p:sldId id="258" r:id="rId4"/>
   </p:sldIdLst>
   <p:sldSz cx="12192000" cy="6858000"/>
   <p:notesSz cx="6858000" cy="9144000"/>
@@ -105,7 +106,2753 @@
       </a:defRPr>
     </a:lvl9pPr>
   </p:defaultTextStyle>
+  <p:extLst>
+    <p:ext uri="{EFAFB233-063F-42B5-8137-9DF3F51BA10A}">
+      <p15:sldGuideLst xmlns:p15="http://schemas.microsoft.com/office/powerpoint/2012/main"/>
+    </p:ext>
+  </p:extLst>
 </p:presentation>
+</file>
+
+<file path=ppt/diagrams/colors1.xml><?xml version="1.0" encoding="utf-8"?>
+<dgm:colorsDef xmlns:dgm="http://schemas.openxmlformats.org/drawingml/2006/diagram" xmlns:a="http://schemas.openxmlformats.org/drawingml/2006/main" uniqueId="urn:microsoft.com/office/officeart/2005/8/colors/accent1_2">
+  <dgm:title val=""/>
+  <dgm:desc val=""/>
+  <dgm:catLst>
+    <dgm:cat type="accent1" pri="11200"/>
+  </dgm:catLst>
+  <dgm:styleLbl name="node0">
+    <dgm:fillClrLst meth="repeat">
+      <a:schemeClr val="accent1"/>
+    </dgm:fillClrLst>
+    <dgm:linClrLst meth="repeat">
+      <a:schemeClr val="lt1"/>
+    </dgm:linClrLst>
+    <dgm:effectClrLst/>
+    <dgm:txLinClrLst/>
+    <dgm:txFillClrLst/>
+    <dgm:txEffectClrLst/>
+  </dgm:styleLbl>
+  <dgm:styleLbl name="alignNode1">
+    <dgm:fillClrLst meth="repeat">
+      <a:schemeClr val="accent1"/>
+    </dgm:fillClrLst>
+    <dgm:linClrLst meth="repeat">
+      <a:schemeClr val="accent1"/>
+    </dgm:linClrLst>
+    <dgm:effectClrLst/>
+    <dgm:txLinClrLst/>
+    <dgm:txFillClrLst/>
+    <dgm:txEffectClrLst/>
+  </dgm:styleLbl>
+  <dgm:styleLbl name="node1">
+    <dgm:fillClrLst meth="repeat">
+      <a:schemeClr val="accent1"/>
+    </dgm:fillClrLst>
+    <dgm:linClrLst meth="repeat">
+      <a:schemeClr val="lt1"/>
+    </dgm:linClrLst>
+    <dgm:effectClrLst/>
+    <dgm:txLinClrLst/>
+    <dgm:txFillClrLst/>
+    <dgm:txEffectClrLst/>
+  </dgm:styleLbl>
+  <dgm:styleLbl name="lnNode1">
+    <dgm:fillClrLst meth="repeat">
+      <a:schemeClr val="accent1"/>
+    </dgm:fillClrLst>
+    <dgm:linClrLst meth="repeat">
+      <a:schemeClr val="lt1"/>
+    </dgm:linClrLst>
+    <dgm:effectClrLst/>
+    <dgm:txLinClrLst/>
+    <dgm:txFillClrLst/>
+    <dgm:txEffectClrLst/>
+  </dgm:styleLbl>
+  <dgm:styleLbl name="vennNode1">
+    <dgm:fillClrLst meth="repeat">
+      <a:schemeClr val="accent1">
+        <a:alpha val="50000"/>
+      </a:schemeClr>
+    </dgm:fillClrLst>
+    <dgm:linClrLst meth="repeat">
+      <a:schemeClr val="lt1"/>
+    </dgm:linClrLst>
+    <dgm:effectClrLst/>
+    <dgm:txLinClrLst/>
+    <dgm:txFillClrLst/>
+    <dgm:txEffectClrLst/>
+  </dgm:styleLbl>
+  <dgm:styleLbl name="node2">
+    <dgm:fillClrLst meth="repeat">
+      <a:schemeClr val="accent1"/>
+    </dgm:fillClrLst>
+    <dgm:linClrLst meth="repeat">
+      <a:schemeClr val="lt1"/>
+    </dgm:linClrLst>
+    <dgm:effectClrLst/>
+    <dgm:txLinClrLst/>
+    <dgm:txFillClrLst/>
+    <dgm:txEffectClrLst/>
+  </dgm:styleLbl>
+  <dgm:styleLbl name="node3">
+    <dgm:fillClrLst meth="repeat">
+      <a:schemeClr val="accent1"/>
+    </dgm:fillClrLst>
+    <dgm:linClrLst meth="repeat">
+      <a:schemeClr val="lt1"/>
+    </dgm:linClrLst>
+    <dgm:effectClrLst/>
+    <dgm:txLinClrLst/>
+    <dgm:txFillClrLst/>
+    <dgm:txEffectClrLst/>
+  </dgm:styleLbl>
+  <dgm:styleLbl name="node4">
+    <dgm:fillClrLst meth="repeat">
+      <a:schemeClr val="accent1"/>
+    </dgm:fillClrLst>
+    <dgm:linClrLst meth="repeat">
+      <a:schemeClr val="lt1"/>
+    </dgm:linClrLst>
+    <dgm:effectClrLst/>
+    <dgm:txLinClrLst/>
+    <dgm:txFillClrLst/>
+    <dgm:txEffectClrLst/>
+  </dgm:styleLbl>
+  <dgm:styleLbl name="fgImgPlace1">
+    <dgm:fillClrLst meth="repeat">
+      <a:schemeClr val="accent1">
+        <a:tint val="50000"/>
+      </a:schemeClr>
+    </dgm:fillClrLst>
+    <dgm:linClrLst meth="repeat">
+      <a:schemeClr val="lt1"/>
+    </dgm:linClrLst>
+    <dgm:effectClrLst/>
+    <dgm:txLinClrLst/>
+    <dgm:txFillClrLst meth="repeat">
+      <a:schemeClr val="lt1"/>
+    </dgm:txFillClrLst>
+    <dgm:txEffectClrLst/>
+  </dgm:styleLbl>
+  <dgm:styleLbl name="alignImgPlace1">
+    <dgm:fillClrLst meth="repeat">
+      <a:schemeClr val="accent1">
+        <a:tint val="50000"/>
+      </a:schemeClr>
+    </dgm:fillClrLst>
+    <dgm:linClrLst meth="repeat">
+      <a:schemeClr val="lt1"/>
+    </dgm:linClrLst>
+    <dgm:effectClrLst/>
+    <dgm:txLinClrLst/>
+    <dgm:txFillClrLst meth="repeat">
+      <a:schemeClr val="lt1"/>
+    </dgm:txFillClrLst>
+    <dgm:txEffectClrLst/>
+  </dgm:styleLbl>
+  <dgm:styleLbl name="bgImgPlace1">
+    <dgm:fillClrLst meth="repeat">
+      <a:schemeClr val="accent1">
+        <a:tint val="50000"/>
+      </a:schemeClr>
+    </dgm:fillClrLst>
+    <dgm:linClrLst meth="repeat">
+      <a:schemeClr val="lt1"/>
+    </dgm:linClrLst>
+    <dgm:effectClrLst/>
+    <dgm:txLinClrLst/>
+    <dgm:txFillClrLst meth="repeat">
+      <a:schemeClr val="lt1"/>
+    </dgm:txFillClrLst>
+    <dgm:txEffectClrLst/>
+  </dgm:styleLbl>
+  <dgm:styleLbl name="sibTrans2D1">
+    <dgm:fillClrLst meth="repeat">
+      <a:schemeClr val="accent1">
+        <a:tint val="60000"/>
+      </a:schemeClr>
+    </dgm:fillClrLst>
+    <dgm:linClrLst meth="repeat">
+      <a:schemeClr val="accent1">
+        <a:tint val="60000"/>
+      </a:schemeClr>
+    </dgm:linClrLst>
+    <dgm:effectClrLst/>
+    <dgm:txLinClrLst/>
+    <dgm:txFillClrLst/>
+    <dgm:txEffectClrLst/>
+  </dgm:styleLbl>
+  <dgm:styleLbl name="fgSibTrans2D1">
+    <dgm:fillClrLst meth="repeat">
+      <a:schemeClr val="accent1">
+        <a:tint val="60000"/>
+      </a:schemeClr>
+    </dgm:fillClrLst>
+    <dgm:linClrLst meth="repeat">
+      <a:schemeClr val="accent1">
+        <a:tint val="60000"/>
+      </a:schemeClr>
+    </dgm:linClrLst>
+    <dgm:effectClrLst/>
+    <dgm:txLinClrLst/>
+    <dgm:txFillClrLst/>
+    <dgm:txEffectClrLst/>
+  </dgm:styleLbl>
+  <dgm:styleLbl name="bgSibTrans2D1">
+    <dgm:fillClrLst meth="repeat">
+      <a:schemeClr val="accent1">
+        <a:tint val="60000"/>
+      </a:schemeClr>
+    </dgm:fillClrLst>
+    <dgm:linClrLst meth="repeat">
+      <a:schemeClr val="accent1">
+        <a:tint val="60000"/>
+      </a:schemeClr>
+    </dgm:linClrLst>
+    <dgm:effectClrLst/>
+    <dgm:txLinClrLst/>
+    <dgm:txFillClrLst/>
+    <dgm:txEffectClrLst/>
+  </dgm:styleLbl>
+  <dgm:styleLbl name="sibTrans1D1">
+    <dgm:fillClrLst meth="repeat">
+      <a:schemeClr val="accent1"/>
+    </dgm:fillClrLst>
+    <dgm:linClrLst meth="repeat">
+      <a:schemeClr val="accent1"/>
+    </dgm:linClrLst>
+    <dgm:effectClrLst/>
+    <dgm:txLinClrLst/>
+    <dgm:txFillClrLst meth="repeat">
+      <a:schemeClr val="tx1"/>
+    </dgm:txFillClrLst>
+    <dgm:txEffectClrLst/>
+  </dgm:styleLbl>
+  <dgm:styleLbl name="callout">
+    <dgm:fillClrLst meth="repeat">
+      <a:schemeClr val="accent1"/>
+    </dgm:fillClrLst>
+    <dgm:linClrLst meth="repeat">
+      <a:schemeClr val="accent1">
+        <a:tint val="50000"/>
+      </a:schemeClr>
+    </dgm:linClrLst>
+    <dgm:effectClrLst/>
+    <dgm:txLinClrLst/>
+    <dgm:txFillClrLst meth="repeat">
+      <a:schemeClr val="tx1"/>
+    </dgm:txFillClrLst>
+    <dgm:txEffectClrLst/>
+  </dgm:styleLbl>
+  <dgm:styleLbl name="asst0">
+    <dgm:fillClrLst meth="repeat">
+      <a:schemeClr val="accent1"/>
+    </dgm:fillClrLst>
+    <dgm:linClrLst meth="repeat">
+      <a:schemeClr val="lt1"/>
+    </dgm:linClrLst>
+    <dgm:effectClrLst/>
+    <dgm:txLinClrLst/>
+    <dgm:txFillClrLst/>
+    <dgm:txEffectClrLst/>
+  </dgm:styleLbl>
+  <dgm:styleLbl name="asst1">
+    <dgm:fillClrLst meth="repeat">
+      <a:schemeClr val="accent1"/>
+    </dgm:fillClrLst>
+    <dgm:linClrLst meth="repeat">
+      <a:schemeClr val="lt1"/>
+    </dgm:linClrLst>
+    <dgm:effectClrLst/>
+    <dgm:txLinClrLst/>
+    <dgm:txFillClrLst/>
+    <dgm:txEffectClrLst/>
+  </dgm:styleLbl>
+  <dgm:styleLbl name="asst2">
+    <dgm:fillClrLst meth="repeat">
+      <a:schemeClr val="accent1"/>
+    </dgm:fillClrLst>
+    <dgm:linClrLst meth="repeat">
+      <a:schemeClr val="lt1"/>
+    </dgm:linClrLst>
+    <dgm:effectClrLst/>
+    <dgm:txLinClrLst/>
+    <dgm:txFillClrLst/>
+    <dgm:txEffectClrLst/>
+  </dgm:styleLbl>
+  <dgm:styleLbl name="asst3">
+    <dgm:fillClrLst meth="repeat">
+      <a:schemeClr val="accent1"/>
+    </dgm:fillClrLst>
+    <dgm:linClrLst meth="repeat">
+      <a:schemeClr val="lt1"/>
+    </dgm:linClrLst>
+    <dgm:effectClrLst/>
+    <dgm:txLinClrLst/>
+    <dgm:txFillClrLst/>
+    <dgm:txEffectClrLst/>
+  </dgm:styleLbl>
+  <dgm:styleLbl name="asst4">
+    <dgm:fillClrLst meth="repeat">
+      <a:schemeClr val="accent1"/>
+    </dgm:fillClrLst>
+    <dgm:linClrLst meth="repeat">
+      <a:schemeClr val="lt1"/>
+    </dgm:linClrLst>
+    <dgm:effectClrLst/>
+    <dgm:txLinClrLst/>
+    <dgm:txFillClrLst/>
+    <dgm:txEffectClrLst/>
+  </dgm:styleLbl>
+  <dgm:styleLbl name="parChTrans2D1">
+    <dgm:fillClrLst meth="repeat">
+      <a:schemeClr val="accent1">
+        <a:tint val="60000"/>
+      </a:schemeClr>
+    </dgm:fillClrLst>
+    <dgm:linClrLst meth="repeat">
+      <a:schemeClr val="accent1">
+        <a:tint val="60000"/>
+      </a:schemeClr>
+    </dgm:linClrLst>
+    <dgm:effectClrLst/>
+    <dgm:txLinClrLst/>
+    <dgm:txFillClrLst meth="repeat">
+      <a:schemeClr val="lt1"/>
+    </dgm:txFillClrLst>
+    <dgm:txEffectClrLst/>
+  </dgm:styleLbl>
+  <dgm:styleLbl name="parChTrans2D2">
+    <dgm:fillClrLst meth="repeat">
+      <a:schemeClr val="accent1"/>
+    </dgm:fillClrLst>
+    <dgm:linClrLst meth="repeat">
+      <a:schemeClr val="accent1"/>
+    </dgm:linClrLst>
+    <dgm:effectClrLst/>
+    <dgm:txLinClrLst/>
+    <dgm:txFillClrLst meth="repeat">
+      <a:schemeClr val="lt1"/>
+    </dgm:txFillClrLst>
+    <dgm:txEffectClrLst/>
+  </dgm:styleLbl>
+  <dgm:styleLbl name="parChTrans2D3">
+    <dgm:fillClrLst meth="repeat">
+      <a:schemeClr val="accent1"/>
+    </dgm:fillClrLst>
+    <dgm:linClrLst meth="repeat">
+      <a:schemeClr val="accent1"/>
+    </dgm:linClrLst>
+    <dgm:effectClrLst/>
+    <dgm:txLinClrLst/>
+    <dgm:txFillClrLst meth="repeat">
+      <a:schemeClr val="lt1"/>
+    </dgm:txFillClrLst>
+    <dgm:txEffectClrLst/>
+  </dgm:styleLbl>
+  <dgm:styleLbl name="parChTrans2D4">
+    <dgm:fillClrLst meth="repeat">
+      <a:schemeClr val="accent1"/>
+    </dgm:fillClrLst>
+    <dgm:linClrLst meth="repeat">
+      <a:schemeClr val="accent1"/>
+    </dgm:linClrLst>
+    <dgm:effectClrLst/>
+    <dgm:txLinClrLst/>
+    <dgm:txFillClrLst meth="repeat">
+      <a:schemeClr val="lt1"/>
+    </dgm:txFillClrLst>
+    <dgm:txEffectClrLst/>
+  </dgm:styleLbl>
+  <dgm:styleLbl name="parChTrans1D1">
+    <dgm:fillClrLst meth="repeat">
+      <a:schemeClr val="accent1"/>
+    </dgm:fillClrLst>
+    <dgm:linClrLst meth="repeat">
+      <a:schemeClr val="accent1">
+        <a:shade val="60000"/>
+      </a:schemeClr>
+    </dgm:linClrLst>
+    <dgm:effectClrLst/>
+    <dgm:txLinClrLst/>
+    <dgm:txFillClrLst meth="repeat">
+      <a:schemeClr val="tx1"/>
+    </dgm:txFillClrLst>
+    <dgm:txEffectClrLst/>
+  </dgm:styleLbl>
+  <dgm:styleLbl name="parChTrans1D2">
+    <dgm:fillClrLst meth="repeat">
+      <a:schemeClr val="accent1"/>
+    </dgm:fillClrLst>
+    <dgm:linClrLst meth="repeat">
+      <a:schemeClr val="accent1">
+        <a:shade val="60000"/>
+      </a:schemeClr>
+    </dgm:linClrLst>
+    <dgm:effectClrLst/>
+    <dgm:txLinClrLst/>
+    <dgm:txFillClrLst meth="repeat">
+      <a:schemeClr val="tx1"/>
+    </dgm:txFillClrLst>
+    <dgm:txEffectClrLst/>
+  </dgm:styleLbl>
+  <dgm:styleLbl name="parChTrans1D3">
+    <dgm:fillClrLst meth="repeat">
+      <a:schemeClr val="accent1"/>
+    </dgm:fillClrLst>
+    <dgm:linClrLst meth="repeat">
+      <a:schemeClr val="accent1">
+        <a:shade val="80000"/>
+      </a:schemeClr>
+    </dgm:linClrLst>
+    <dgm:effectClrLst/>
+    <dgm:txLinClrLst/>
+    <dgm:txFillClrLst meth="repeat">
+      <a:schemeClr val="tx1"/>
+    </dgm:txFillClrLst>
+    <dgm:txEffectClrLst/>
+  </dgm:styleLbl>
+  <dgm:styleLbl name="parChTrans1D4">
+    <dgm:fillClrLst meth="repeat">
+      <a:schemeClr val="accent1"/>
+    </dgm:fillClrLst>
+    <dgm:linClrLst meth="repeat">
+      <a:schemeClr val="accent1">
+        <a:shade val="80000"/>
+      </a:schemeClr>
+    </dgm:linClrLst>
+    <dgm:effectClrLst/>
+    <dgm:txLinClrLst/>
+    <dgm:txFillClrLst meth="repeat">
+      <a:schemeClr val="tx1"/>
+    </dgm:txFillClrLst>
+    <dgm:txEffectClrLst/>
+  </dgm:styleLbl>
+  <dgm:styleLbl name="fgAcc1">
+    <dgm:fillClrLst meth="repeat">
+      <a:schemeClr val="lt1">
+        <a:alpha val="90000"/>
+      </a:schemeClr>
+    </dgm:fillClrLst>
+    <dgm:linClrLst meth="repeat">
+      <a:schemeClr val="accent1"/>
+    </dgm:linClrLst>
+    <dgm:effectClrLst/>
+    <dgm:txLinClrLst/>
+    <dgm:txFillClrLst meth="repeat">
+      <a:schemeClr val="dk1"/>
+    </dgm:txFillClrLst>
+    <dgm:txEffectClrLst/>
+  </dgm:styleLbl>
+  <dgm:styleLbl name="conFgAcc1">
+    <dgm:fillClrLst meth="repeat">
+      <a:schemeClr val="lt1">
+        <a:alpha val="90000"/>
+      </a:schemeClr>
+    </dgm:fillClrLst>
+    <dgm:linClrLst meth="repeat">
+      <a:schemeClr val="accent1"/>
+    </dgm:linClrLst>
+    <dgm:effectClrLst/>
+    <dgm:txLinClrLst/>
+    <dgm:txFillClrLst meth="repeat">
+      <a:schemeClr val="dk1"/>
+    </dgm:txFillClrLst>
+    <dgm:txEffectClrLst/>
+  </dgm:styleLbl>
+  <dgm:styleLbl name="alignAcc1">
+    <dgm:fillClrLst meth="repeat">
+      <a:schemeClr val="lt1">
+        <a:alpha val="90000"/>
+      </a:schemeClr>
+    </dgm:fillClrLst>
+    <dgm:linClrLst meth="repeat">
+      <a:schemeClr val="accent1"/>
+    </dgm:linClrLst>
+    <dgm:effectClrLst/>
+    <dgm:txLinClrLst/>
+    <dgm:txFillClrLst meth="repeat">
+      <a:schemeClr val="dk1"/>
+    </dgm:txFillClrLst>
+    <dgm:txEffectClrLst/>
+  </dgm:styleLbl>
+  <dgm:styleLbl name="trAlignAcc1">
+    <dgm:fillClrLst meth="repeat">
+      <a:schemeClr val="lt1">
+        <a:alpha val="40000"/>
+      </a:schemeClr>
+    </dgm:fillClrLst>
+    <dgm:linClrLst meth="repeat">
+      <a:schemeClr val="accent1"/>
+    </dgm:linClrLst>
+    <dgm:effectClrLst/>
+    <dgm:txLinClrLst/>
+    <dgm:txFillClrLst meth="repeat">
+      <a:schemeClr val="dk1"/>
+    </dgm:txFillClrLst>
+    <dgm:txEffectClrLst/>
+  </dgm:styleLbl>
+  <dgm:styleLbl name="bgAcc1">
+    <dgm:fillClrLst meth="repeat">
+      <a:schemeClr val="lt1">
+        <a:alpha val="90000"/>
+      </a:schemeClr>
+    </dgm:fillClrLst>
+    <dgm:linClrLst meth="repeat">
+      <a:schemeClr val="accent1"/>
+    </dgm:linClrLst>
+    <dgm:effectClrLst/>
+    <dgm:txLinClrLst/>
+    <dgm:txFillClrLst meth="repeat">
+      <a:schemeClr val="dk1"/>
+    </dgm:txFillClrLst>
+    <dgm:txEffectClrLst/>
+  </dgm:styleLbl>
+  <dgm:styleLbl name="solidFgAcc1">
+    <dgm:fillClrLst meth="repeat">
+      <a:schemeClr val="lt1"/>
+    </dgm:fillClrLst>
+    <dgm:linClrLst meth="repeat">
+      <a:schemeClr val="accent1"/>
+    </dgm:linClrLst>
+    <dgm:effectClrLst/>
+    <dgm:txLinClrLst/>
+    <dgm:txFillClrLst meth="repeat">
+      <a:schemeClr val="dk1"/>
+    </dgm:txFillClrLst>
+    <dgm:txEffectClrLst/>
+  </dgm:styleLbl>
+  <dgm:styleLbl name="solidAlignAcc1">
+    <dgm:fillClrLst meth="repeat">
+      <a:schemeClr val="lt1"/>
+    </dgm:fillClrLst>
+    <dgm:linClrLst meth="repeat">
+      <a:schemeClr val="accent1"/>
+    </dgm:linClrLst>
+    <dgm:effectClrLst/>
+    <dgm:txLinClrLst/>
+    <dgm:txFillClrLst meth="repeat">
+      <a:schemeClr val="dk1"/>
+    </dgm:txFillClrLst>
+    <dgm:txEffectClrLst/>
+  </dgm:styleLbl>
+  <dgm:styleLbl name="solidBgAcc1">
+    <dgm:fillClrLst meth="repeat">
+      <a:schemeClr val="lt1"/>
+    </dgm:fillClrLst>
+    <dgm:linClrLst meth="repeat">
+      <a:schemeClr val="accent1"/>
+    </dgm:linClrLst>
+    <dgm:effectClrLst/>
+    <dgm:txLinClrLst/>
+    <dgm:txFillClrLst meth="repeat">
+      <a:schemeClr val="dk1"/>
+    </dgm:txFillClrLst>
+    <dgm:txEffectClrLst/>
+  </dgm:styleLbl>
+  <dgm:styleLbl name="fgAccFollowNode1">
+    <dgm:fillClrLst meth="repeat">
+      <a:schemeClr val="accent1">
+        <a:alpha val="90000"/>
+        <a:tint val="40000"/>
+      </a:schemeClr>
+    </dgm:fillClrLst>
+    <dgm:linClrLst meth="repeat">
+      <a:schemeClr val="accent1">
+        <a:alpha val="90000"/>
+        <a:tint val="40000"/>
+      </a:schemeClr>
+    </dgm:linClrLst>
+    <dgm:effectClrLst/>
+    <dgm:txLinClrLst/>
+    <dgm:txFillClrLst meth="repeat">
+      <a:schemeClr val="dk1"/>
+    </dgm:txFillClrLst>
+    <dgm:txEffectClrLst/>
+  </dgm:styleLbl>
+  <dgm:styleLbl name="alignAccFollowNode1">
+    <dgm:fillClrLst meth="repeat">
+      <a:schemeClr val="accent1">
+        <a:alpha val="90000"/>
+        <a:tint val="40000"/>
+      </a:schemeClr>
+    </dgm:fillClrLst>
+    <dgm:linClrLst meth="repeat">
+      <a:schemeClr val="accent1">
+        <a:alpha val="90000"/>
+        <a:tint val="40000"/>
+      </a:schemeClr>
+    </dgm:linClrLst>
+    <dgm:effectClrLst/>
+    <dgm:txLinClrLst/>
+    <dgm:txFillClrLst meth="repeat">
+      <a:schemeClr val="dk1"/>
+    </dgm:txFillClrLst>
+    <dgm:txEffectClrLst/>
+  </dgm:styleLbl>
+  <dgm:styleLbl name="bgAccFollowNode1">
+    <dgm:fillClrLst meth="repeat">
+      <a:schemeClr val="accent1">
+        <a:alpha val="90000"/>
+        <a:tint val="40000"/>
+      </a:schemeClr>
+    </dgm:fillClrLst>
+    <dgm:linClrLst meth="repeat">
+      <a:schemeClr val="accent1">
+        <a:alpha val="90000"/>
+        <a:tint val="40000"/>
+      </a:schemeClr>
+    </dgm:linClrLst>
+    <dgm:effectClrLst/>
+    <dgm:txLinClrLst/>
+    <dgm:txFillClrLst meth="repeat">
+      <a:schemeClr val="dk1"/>
+    </dgm:txFillClrLst>
+    <dgm:txEffectClrLst/>
+  </dgm:styleLbl>
+  <dgm:styleLbl name="fgAcc0">
+    <dgm:fillClrLst meth="repeat">
+      <a:schemeClr val="lt1">
+        <a:alpha val="90000"/>
+      </a:schemeClr>
+    </dgm:fillClrLst>
+    <dgm:linClrLst meth="repeat">
+      <a:schemeClr val="accent1"/>
+    </dgm:linClrLst>
+    <dgm:effectClrLst/>
+    <dgm:txLinClrLst/>
+    <dgm:txFillClrLst meth="repeat">
+      <a:schemeClr val="dk1"/>
+    </dgm:txFillClrLst>
+    <dgm:txEffectClrLst/>
+  </dgm:styleLbl>
+  <dgm:styleLbl name="fgAcc2">
+    <dgm:fillClrLst meth="repeat">
+      <a:schemeClr val="lt1">
+        <a:alpha val="90000"/>
+      </a:schemeClr>
+    </dgm:fillClrLst>
+    <dgm:linClrLst meth="repeat">
+      <a:schemeClr val="accent1"/>
+    </dgm:linClrLst>
+    <dgm:effectClrLst/>
+    <dgm:txLinClrLst/>
+    <dgm:txFillClrLst meth="repeat">
+      <a:schemeClr val="dk1"/>
+    </dgm:txFillClrLst>
+    <dgm:txEffectClrLst/>
+  </dgm:styleLbl>
+  <dgm:styleLbl name="fgAcc3">
+    <dgm:fillClrLst meth="repeat">
+      <a:schemeClr val="lt1">
+        <a:alpha val="90000"/>
+      </a:schemeClr>
+    </dgm:fillClrLst>
+    <dgm:linClrLst meth="repeat">
+      <a:schemeClr val="accent1"/>
+    </dgm:linClrLst>
+    <dgm:effectClrLst/>
+    <dgm:txLinClrLst/>
+    <dgm:txFillClrLst meth="repeat">
+      <a:schemeClr val="dk1"/>
+    </dgm:txFillClrLst>
+    <dgm:txEffectClrLst/>
+  </dgm:styleLbl>
+  <dgm:styleLbl name="fgAcc4">
+    <dgm:fillClrLst meth="repeat">
+      <a:schemeClr val="lt1">
+        <a:alpha val="90000"/>
+      </a:schemeClr>
+    </dgm:fillClrLst>
+    <dgm:linClrLst meth="repeat">
+      <a:schemeClr val="accent1"/>
+    </dgm:linClrLst>
+    <dgm:effectClrLst/>
+    <dgm:txLinClrLst/>
+    <dgm:txFillClrLst meth="repeat">
+      <a:schemeClr val="dk1"/>
+    </dgm:txFillClrLst>
+    <dgm:txEffectClrLst/>
+  </dgm:styleLbl>
+  <dgm:styleLbl name="bgShp">
+    <dgm:fillClrLst meth="repeat">
+      <a:schemeClr val="accent1">
+        <a:tint val="40000"/>
+      </a:schemeClr>
+    </dgm:fillClrLst>
+    <dgm:linClrLst meth="repeat">
+      <a:schemeClr val="accent1"/>
+    </dgm:linClrLst>
+    <dgm:effectClrLst/>
+    <dgm:txLinClrLst/>
+    <dgm:txFillClrLst meth="repeat">
+      <a:schemeClr val="dk1"/>
+    </dgm:txFillClrLst>
+    <dgm:txEffectClrLst/>
+  </dgm:styleLbl>
+  <dgm:styleLbl name="dkBgShp">
+    <dgm:fillClrLst meth="repeat">
+      <a:schemeClr val="accent1">
+        <a:shade val="80000"/>
+      </a:schemeClr>
+    </dgm:fillClrLst>
+    <dgm:linClrLst meth="repeat">
+      <a:schemeClr val="accent1"/>
+    </dgm:linClrLst>
+    <dgm:effectClrLst/>
+    <dgm:txLinClrLst/>
+    <dgm:txFillClrLst meth="repeat">
+      <a:schemeClr val="lt1"/>
+    </dgm:txFillClrLst>
+    <dgm:txEffectClrLst/>
+  </dgm:styleLbl>
+  <dgm:styleLbl name="trBgShp">
+    <dgm:fillClrLst meth="repeat">
+      <a:schemeClr val="accent1">
+        <a:tint val="50000"/>
+        <a:alpha val="40000"/>
+      </a:schemeClr>
+    </dgm:fillClrLst>
+    <dgm:linClrLst meth="repeat">
+      <a:schemeClr val="accent1"/>
+    </dgm:linClrLst>
+    <dgm:effectClrLst/>
+    <dgm:txLinClrLst/>
+    <dgm:txFillClrLst meth="repeat">
+      <a:schemeClr val="lt1"/>
+    </dgm:txFillClrLst>
+    <dgm:txEffectClrLst/>
+  </dgm:styleLbl>
+  <dgm:styleLbl name="fgShp">
+    <dgm:fillClrLst meth="repeat">
+      <a:schemeClr val="accent1">
+        <a:tint val="60000"/>
+      </a:schemeClr>
+    </dgm:fillClrLst>
+    <dgm:linClrLst meth="repeat">
+      <a:schemeClr val="lt1"/>
+    </dgm:linClrLst>
+    <dgm:effectClrLst/>
+    <dgm:txLinClrLst/>
+    <dgm:txFillClrLst meth="repeat">
+      <a:schemeClr val="dk1"/>
+    </dgm:txFillClrLst>
+    <dgm:txEffectClrLst/>
+  </dgm:styleLbl>
+  <dgm:styleLbl name="revTx">
+    <dgm:fillClrLst meth="repeat">
+      <a:schemeClr val="lt1">
+        <a:alpha val="0"/>
+      </a:schemeClr>
+    </dgm:fillClrLst>
+    <dgm:linClrLst meth="repeat">
+      <a:schemeClr val="dk1">
+        <a:alpha val="0"/>
+      </a:schemeClr>
+    </dgm:linClrLst>
+    <dgm:effectClrLst/>
+    <dgm:txLinClrLst/>
+    <dgm:txFillClrLst meth="repeat">
+      <a:schemeClr val="tx1"/>
+    </dgm:txFillClrLst>
+    <dgm:txEffectClrLst/>
+  </dgm:styleLbl>
+</dgm:colorsDef>
+</file>
+
+<file path=ppt/diagrams/data1.xml><?xml version="1.0" encoding="utf-8"?>
+<dgm:dataModel xmlns:dgm="http://schemas.openxmlformats.org/drawingml/2006/diagram" xmlns:a="http://schemas.openxmlformats.org/drawingml/2006/main">
+  <dgm:ptLst>
+    <dgm:pt modelId="{75294473-DFCF-4043-B82B-8FE18134A486}" type="doc">
+      <dgm:prSet loTypeId="urn:microsoft.com/office/officeart/2005/8/layout/process1" loCatId="process" qsTypeId="urn:microsoft.com/office/officeart/2005/8/quickstyle/simple1" qsCatId="simple" csTypeId="urn:microsoft.com/office/officeart/2005/8/colors/accent1_2" csCatId="accent1" phldr="1"/>
+      <dgm:spPr/>
+    </dgm:pt>
+    <dgm:pt modelId="{1F8A425C-BCAA-4DD5-A9EE-B5DA061346B3}">
+      <dgm:prSet phldrT="[Text]"/>
+      <dgm:spPr/>
+      <dgm:t>
+        <a:bodyPr/>
+        <a:lstStyle/>
+        <a:p>
+          <a:r>
+            <a:rPr lang="en-US" dirty="0" smtClean="0"/>
+            <a:t>Fork</a:t>
+          </a:r>
+          <a:endParaRPr lang="en-US" dirty="0"/>
+        </a:p>
+      </dgm:t>
+    </dgm:pt>
+    <dgm:pt modelId="{D285106E-46DC-41AA-AF00-F235F9154F9A}" type="parTrans" cxnId="{C0BA1B59-7D69-4AE2-B6F4-53795B5346F6}">
+      <dgm:prSet/>
+      <dgm:spPr/>
+      <dgm:t>
+        <a:bodyPr/>
+        <a:lstStyle/>
+        <a:p>
+          <a:endParaRPr lang="en-US"/>
+        </a:p>
+      </dgm:t>
+    </dgm:pt>
+    <dgm:pt modelId="{C844B916-1165-43C4-8DE2-CD163E1EC925}" type="sibTrans" cxnId="{C0BA1B59-7D69-4AE2-B6F4-53795B5346F6}">
+      <dgm:prSet/>
+      <dgm:spPr/>
+      <dgm:t>
+        <a:bodyPr/>
+        <a:lstStyle/>
+        <a:p>
+          <a:endParaRPr lang="en-US"/>
+        </a:p>
+      </dgm:t>
+    </dgm:pt>
+    <dgm:pt modelId="{115D0249-42EE-4270-8725-59F4E4D3AB1B}">
+      <dgm:prSet phldrT="[Text]"/>
+      <dgm:spPr/>
+      <dgm:t>
+        <a:bodyPr/>
+        <a:lstStyle/>
+        <a:p>
+          <a:r>
+            <a:rPr lang="en-US" dirty="0" smtClean="0"/>
+            <a:t>Pull request</a:t>
+          </a:r>
+          <a:endParaRPr lang="en-US" dirty="0"/>
+        </a:p>
+      </dgm:t>
+    </dgm:pt>
+    <dgm:pt modelId="{8E714540-FE8A-44B0-84A2-332D73706E92}" type="parTrans" cxnId="{EBCF41BB-5567-48C7-9454-FCC2D7025B04}">
+      <dgm:prSet/>
+      <dgm:spPr/>
+      <dgm:t>
+        <a:bodyPr/>
+        <a:lstStyle/>
+        <a:p>
+          <a:endParaRPr lang="en-US"/>
+        </a:p>
+      </dgm:t>
+    </dgm:pt>
+    <dgm:pt modelId="{44FEEAFA-CABD-4F04-9647-E3FD48447E30}" type="sibTrans" cxnId="{EBCF41BB-5567-48C7-9454-FCC2D7025B04}">
+      <dgm:prSet/>
+      <dgm:spPr/>
+      <dgm:t>
+        <a:bodyPr/>
+        <a:lstStyle/>
+        <a:p>
+          <a:endParaRPr lang="en-US"/>
+        </a:p>
+      </dgm:t>
+    </dgm:pt>
+    <dgm:pt modelId="{168F6CDB-6CAE-4077-9E35-B28A0B148460}">
+      <dgm:prSet phldrT="[Text]"/>
+      <dgm:spPr/>
+      <dgm:t>
+        <a:bodyPr/>
+        <a:lstStyle/>
+        <a:p>
+          <a:r>
+            <a:rPr lang="en-US" dirty="0" err="1" smtClean="0"/>
+            <a:t>Revisão</a:t>
+          </a:r>
+          <a:endParaRPr lang="en-US" dirty="0"/>
+        </a:p>
+      </dgm:t>
+    </dgm:pt>
+    <dgm:pt modelId="{ED68CD7B-2B28-4000-96CD-17F70EF70D59}" type="parTrans" cxnId="{92485772-7DE2-4B0C-AB45-BD4A183ACE11}">
+      <dgm:prSet/>
+      <dgm:spPr/>
+      <dgm:t>
+        <a:bodyPr/>
+        <a:lstStyle/>
+        <a:p>
+          <a:endParaRPr lang="en-US"/>
+        </a:p>
+      </dgm:t>
+    </dgm:pt>
+    <dgm:pt modelId="{636D6D0D-9FDD-4E34-B71B-37EABAFE33E5}" type="sibTrans" cxnId="{92485772-7DE2-4B0C-AB45-BD4A183ACE11}">
+      <dgm:prSet/>
+      <dgm:spPr/>
+      <dgm:t>
+        <a:bodyPr/>
+        <a:lstStyle/>
+        <a:p>
+          <a:endParaRPr lang="en-US"/>
+        </a:p>
+      </dgm:t>
+    </dgm:pt>
+    <dgm:pt modelId="{C2D68E03-FE95-47AE-A068-B590091E4918}">
+      <dgm:prSet phldrT="[Text]"/>
+      <dgm:spPr/>
+      <dgm:t>
+        <a:bodyPr/>
+        <a:lstStyle/>
+        <a:p>
+          <a:r>
+            <a:rPr lang="en-US" dirty="0" err="1" smtClean="0"/>
+            <a:t>Aceitação</a:t>
+          </a:r>
+          <a:endParaRPr lang="en-US" dirty="0"/>
+        </a:p>
+      </dgm:t>
+    </dgm:pt>
+    <dgm:pt modelId="{7DDB8123-F13C-4AFD-9521-AC3E7B4A14F6}" type="parTrans" cxnId="{E1700A77-C1C9-4274-BEC1-9F045BE09E0A}">
+      <dgm:prSet/>
+      <dgm:spPr/>
+      <dgm:t>
+        <a:bodyPr/>
+        <a:lstStyle/>
+        <a:p>
+          <a:endParaRPr lang="en-US"/>
+        </a:p>
+      </dgm:t>
+    </dgm:pt>
+    <dgm:pt modelId="{A9B914A8-0BEF-4DE2-9112-92521A07B258}" type="sibTrans" cxnId="{E1700A77-C1C9-4274-BEC1-9F045BE09E0A}">
+      <dgm:prSet/>
+      <dgm:spPr/>
+      <dgm:t>
+        <a:bodyPr/>
+        <a:lstStyle/>
+        <a:p>
+          <a:endParaRPr lang="en-US"/>
+        </a:p>
+      </dgm:t>
+    </dgm:pt>
+    <dgm:pt modelId="{38667495-51B7-460C-BF24-D36D2A4EFC73}" type="pres">
+      <dgm:prSet presAssocID="{75294473-DFCF-4043-B82B-8FE18134A486}" presName="Name0" presStyleCnt="0">
+        <dgm:presLayoutVars>
+          <dgm:dir/>
+          <dgm:resizeHandles val="exact"/>
+        </dgm:presLayoutVars>
+      </dgm:prSet>
+      <dgm:spPr/>
+    </dgm:pt>
+    <dgm:pt modelId="{559D5182-B416-4240-A858-BA8FEF2C836F}" type="pres">
+      <dgm:prSet presAssocID="{1F8A425C-BCAA-4DD5-A9EE-B5DA061346B3}" presName="node" presStyleLbl="node1" presStyleIdx="0" presStyleCnt="4">
+        <dgm:presLayoutVars>
+          <dgm:bulletEnabled val="1"/>
+        </dgm:presLayoutVars>
+      </dgm:prSet>
+      <dgm:spPr/>
+      <dgm:t>
+        <a:bodyPr/>
+        <a:lstStyle/>
+        <a:p>
+          <a:endParaRPr lang="en-US"/>
+        </a:p>
+      </dgm:t>
+    </dgm:pt>
+    <dgm:pt modelId="{F9106882-5DBD-417B-9C70-E3D784ECDDEF}" type="pres">
+      <dgm:prSet presAssocID="{C844B916-1165-43C4-8DE2-CD163E1EC925}" presName="sibTrans" presStyleLbl="sibTrans2D1" presStyleIdx="0" presStyleCnt="3"/>
+      <dgm:spPr/>
+    </dgm:pt>
+    <dgm:pt modelId="{01BC79A4-9117-4839-A3B6-0DCA823B7963}" type="pres">
+      <dgm:prSet presAssocID="{C844B916-1165-43C4-8DE2-CD163E1EC925}" presName="connectorText" presStyleLbl="sibTrans2D1" presStyleIdx="0" presStyleCnt="3"/>
+      <dgm:spPr/>
+    </dgm:pt>
+    <dgm:pt modelId="{B9E44327-9809-4AB6-8291-20929EFFC5B2}" type="pres">
+      <dgm:prSet presAssocID="{115D0249-42EE-4270-8725-59F4E4D3AB1B}" presName="node" presStyleLbl="node1" presStyleIdx="1" presStyleCnt="4">
+        <dgm:presLayoutVars>
+          <dgm:bulletEnabled val="1"/>
+        </dgm:presLayoutVars>
+      </dgm:prSet>
+      <dgm:spPr/>
+    </dgm:pt>
+    <dgm:pt modelId="{67E4972E-D8B4-4348-9009-259194C1C3BA}" type="pres">
+      <dgm:prSet presAssocID="{44FEEAFA-CABD-4F04-9647-E3FD48447E30}" presName="sibTrans" presStyleLbl="sibTrans2D1" presStyleIdx="1" presStyleCnt="3"/>
+      <dgm:spPr/>
+    </dgm:pt>
+    <dgm:pt modelId="{1849DC60-F9AB-4E59-B050-958AEF9D057A}" type="pres">
+      <dgm:prSet presAssocID="{44FEEAFA-CABD-4F04-9647-E3FD48447E30}" presName="connectorText" presStyleLbl="sibTrans2D1" presStyleIdx="1" presStyleCnt="3"/>
+      <dgm:spPr/>
+    </dgm:pt>
+    <dgm:pt modelId="{F1A4EF45-1359-438E-AEFA-F0B45EB9BA92}" type="pres">
+      <dgm:prSet presAssocID="{168F6CDB-6CAE-4077-9E35-B28A0B148460}" presName="node" presStyleLbl="node1" presStyleIdx="2" presStyleCnt="4">
+        <dgm:presLayoutVars>
+          <dgm:bulletEnabled val="1"/>
+        </dgm:presLayoutVars>
+      </dgm:prSet>
+      <dgm:spPr/>
+      <dgm:t>
+        <a:bodyPr/>
+        <a:lstStyle/>
+        <a:p>
+          <a:endParaRPr lang="en-US"/>
+        </a:p>
+      </dgm:t>
+    </dgm:pt>
+    <dgm:pt modelId="{F7B334A7-EDBB-40E7-9F5F-266643AFB6E7}" type="pres">
+      <dgm:prSet presAssocID="{636D6D0D-9FDD-4E34-B71B-37EABAFE33E5}" presName="sibTrans" presStyleLbl="sibTrans2D1" presStyleIdx="2" presStyleCnt="3"/>
+      <dgm:spPr/>
+    </dgm:pt>
+    <dgm:pt modelId="{CAFB0D1D-6A76-4954-96A0-C558FD67FA67}" type="pres">
+      <dgm:prSet presAssocID="{636D6D0D-9FDD-4E34-B71B-37EABAFE33E5}" presName="connectorText" presStyleLbl="sibTrans2D1" presStyleIdx="2" presStyleCnt="3"/>
+      <dgm:spPr/>
+    </dgm:pt>
+    <dgm:pt modelId="{CBDFCA78-55BF-4D86-A10E-3E0C087C2A27}" type="pres">
+      <dgm:prSet presAssocID="{C2D68E03-FE95-47AE-A068-B590091E4918}" presName="node" presStyleLbl="node1" presStyleIdx="3" presStyleCnt="4" custLinFactNeighborX="-2169" custLinFactNeighborY="1381">
+        <dgm:presLayoutVars>
+          <dgm:bulletEnabled val="1"/>
+        </dgm:presLayoutVars>
+      </dgm:prSet>
+      <dgm:spPr/>
+      <dgm:t>
+        <a:bodyPr/>
+        <a:lstStyle/>
+        <a:p>
+          <a:endParaRPr lang="en-US"/>
+        </a:p>
+      </dgm:t>
+    </dgm:pt>
+  </dgm:ptLst>
+  <dgm:cxnLst>
+    <dgm:cxn modelId="{93E48465-6574-43D8-ACC9-31E37FDDCBE1}" type="presOf" srcId="{C2D68E03-FE95-47AE-A068-B590091E4918}" destId="{CBDFCA78-55BF-4D86-A10E-3E0C087C2A27}" srcOrd="0" destOrd="0" presId="urn:microsoft.com/office/officeart/2005/8/layout/process1"/>
+    <dgm:cxn modelId="{44488259-1329-4685-BD8E-6AD3840E5C2B}" type="presOf" srcId="{1F8A425C-BCAA-4DD5-A9EE-B5DA061346B3}" destId="{559D5182-B416-4240-A858-BA8FEF2C836F}" srcOrd="0" destOrd="0" presId="urn:microsoft.com/office/officeart/2005/8/layout/process1"/>
+    <dgm:cxn modelId="{E0FA533B-D7F9-4FCB-A4DF-0B9F4E25121F}" type="presOf" srcId="{115D0249-42EE-4270-8725-59F4E4D3AB1B}" destId="{B9E44327-9809-4AB6-8291-20929EFFC5B2}" srcOrd="0" destOrd="0" presId="urn:microsoft.com/office/officeart/2005/8/layout/process1"/>
+    <dgm:cxn modelId="{92485772-7DE2-4B0C-AB45-BD4A183ACE11}" srcId="{75294473-DFCF-4043-B82B-8FE18134A486}" destId="{168F6CDB-6CAE-4077-9E35-B28A0B148460}" srcOrd="2" destOrd="0" parTransId="{ED68CD7B-2B28-4000-96CD-17F70EF70D59}" sibTransId="{636D6D0D-9FDD-4E34-B71B-37EABAFE33E5}"/>
+    <dgm:cxn modelId="{F4D2A6A2-DEE1-4961-BFE9-2621BCF2896D}" type="presOf" srcId="{168F6CDB-6CAE-4077-9E35-B28A0B148460}" destId="{F1A4EF45-1359-438E-AEFA-F0B45EB9BA92}" srcOrd="0" destOrd="0" presId="urn:microsoft.com/office/officeart/2005/8/layout/process1"/>
+    <dgm:cxn modelId="{8C13D5E8-EB42-43EE-977B-53126611B62E}" type="presOf" srcId="{C844B916-1165-43C4-8DE2-CD163E1EC925}" destId="{F9106882-5DBD-417B-9C70-E3D784ECDDEF}" srcOrd="0" destOrd="0" presId="urn:microsoft.com/office/officeart/2005/8/layout/process1"/>
+    <dgm:cxn modelId="{A84599E4-6138-4719-BEE6-FB34325E0D13}" type="presOf" srcId="{44FEEAFA-CABD-4F04-9647-E3FD48447E30}" destId="{1849DC60-F9AB-4E59-B050-958AEF9D057A}" srcOrd="1" destOrd="0" presId="urn:microsoft.com/office/officeart/2005/8/layout/process1"/>
+    <dgm:cxn modelId="{C0BA1B59-7D69-4AE2-B6F4-53795B5346F6}" srcId="{75294473-DFCF-4043-B82B-8FE18134A486}" destId="{1F8A425C-BCAA-4DD5-A9EE-B5DA061346B3}" srcOrd="0" destOrd="0" parTransId="{D285106E-46DC-41AA-AF00-F235F9154F9A}" sibTransId="{C844B916-1165-43C4-8DE2-CD163E1EC925}"/>
+    <dgm:cxn modelId="{EC0BE8B6-F6BA-4FB4-BF8C-C6C1D9167B6D}" type="presOf" srcId="{75294473-DFCF-4043-B82B-8FE18134A486}" destId="{38667495-51B7-460C-BF24-D36D2A4EFC73}" srcOrd="0" destOrd="0" presId="urn:microsoft.com/office/officeart/2005/8/layout/process1"/>
+    <dgm:cxn modelId="{754FA7A4-2CD2-4572-953A-866796FCE3D1}" type="presOf" srcId="{44FEEAFA-CABD-4F04-9647-E3FD48447E30}" destId="{67E4972E-D8B4-4348-9009-259194C1C3BA}" srcOrd="0" destOrd="0" presId="urn:microsoft.com/office/officeart/2005/8/layout/process1"/>
+    <dgm:cxn modelId="{6165E37C-6B14-44F5-A07C-07918B4AD90D}" type="presOf" srcId="{C844B916-1165-43C4-8DE2-CD163E1EC925}" destId="{01BC79A4-9117-4839-A3B6-0DCA823B7963}" srcOrd="1" destOrd="0" presId="urn:microsoft.com/office/officeart/2005/8/layout/process1"/>
+    <dgm:cxn modelId="{4E7F6707-410B-4E5E-BA66-78EA13E8BE51}" type="presOf" srcId="{636D6D0D-9FDD-4E34-B71B-37EABAFE33E5}" destId="{F7B334A7-EDBB-40E7-9F5F-266643AFB6E7}" srcOrd="0" destOrd="0" presId="urn:microsoft.com/office/officeart/2005/8/layout/process1"/>
+    <dgm:cxn modelId="{E1700A77-C1C9-4274-BEC1-9F045BE09E0A}" srcId="{75294473-DFCF-4043-B82B-8FE18134A486}" destId="{C2D68E03-FE95-47AE-A068-B590091E4918}" srcOrd="3" destOrd="0" parTransId="{7DDB8123-F13C-4AFD-9521-AC3E7B4A14F6}" sibTransId="{A9B914A8-0BEF-4DE2-9112-92521A07B258}"/>
+    <dgm:cxn modelId="{EBCF41BB-5567-48C7-9454-FCC2D7025B04}" srcId="{75294473-DFCF-4043-B82B-8FE18134A486}" destId="{115D0249-42EE-4270-8725-59F4E4D3AB1B}" srcOrd="1" destOrd="0" parTransId="{8E714540-FE8A-44B0-84A2-332D73706E92}" sibTransId="{44FEEAFA-CABD-4F04-9647-E3FD48447E30}"/>
+    <dgm:cxn modelId="{8CA566BB-BD84-4DDC-84CE-1AD203137032}" type="presOf" srcId="{636D6D0D-9FDD-4E34-B71B-37EABAFE33E5}" destId="{CAFB0D1D-6A76-4954-96A0-C558FD67FA67}" srcOrd="1" destOrd="0" presId="urn:microsoft.com/office/officeart/2005/8/layout/process1"/>
+    <dgm:cxn modelId="{7EA90540-0273-464C-B5DC-4507AB7D0EEA}" type="presParOf" srcId="{38667495-51B7-460C-BF24-D36D2A4EFC73}" destId="{559D5182-B416-4240-A858-BA8FEF2C836F}" srcOrd="0" destOrd="0" presId="urn:microsoft.com/office/officeart/2005/8/layout/process1"/>
+    <dgm:cxn modelId="{57EB1E32-910C-4C6A-BEA2-2383839AA61E}" type="presParOf" srcId="{38667495-51B7-460C-BF24-D36D2A4EFC73}" destId="{F9106882-5DBD-417B-9C70-E3D784ECDDEF}" srcOrd="1" destOrd="0" presId="urn:microsoft.com/office/officeart/2005/8/layout/process1"/>
+    <dgm:cxn modelId="{7921E4DC-FADC-4B26-AF51-3442F9549DBA}" type="presParOf" srcId="{F9106882-5DBD-417B-9C70-E3D784ECDDEF}" destId="{01BC79A4-9117-4839-A3B6-0DCA823B7963}" srcOrd="0" destOrd="0" presId="urn:microsoft.com/office/officeart/2005/8/layout/process1"/>
+    <dgm:cxn modelId="{33D83966-E462-46DF-B40C-9D94373098F5}" type="presParOf" srcId="{38667495-51B7-460C-BF24-D36D2A4EFC73}" destId="{B9E44327-9809-4AB6-8291-20929EFFC5B2}" srcOrd="2" destOrd="0" presId="urn:microsoft.com/office/officeart/2005/8/layout/process1"/>
+    <dgm:cxn modelId="{0D28D3E2-6BFC-47F2-8760-149E176A3AB7}" type="presParOf" srcId="{38667495-51B7-460C-BF24-D36D2A4EFC73}" destId="{67E4972E-D8B4-4348-9009-259194C1C3BA}" srcOrd="3" destOrd="0" presId="urn:microsoft.com/office/officeart/2005/8/layout/process1"/>
+    <dgm:cxn modelId="{3B089100-ED01-4633-86C4-19E704F7503D}" type="presParOf" srcId="{67E4972E-D8B4-4348-9009-259194C1C3BA}" destId="{1849DC60-F9AB-4E59-B050-958AEF9D057A}" srcOrd="0" destOrd="0" presId="urn:microsoft.com/office/officeart/2005/8/layout/process1"/>
+    <dgm:cxn modelId="{4F3AD756-5466-4C5C-841C-1DE6057B28AA}" type="presParOf" srcId="{38667495-51B7-460C-BF24-D36D2A4EFC73}" destId="{F1A4EF45-1359-438E-AEFA-F0B45EB9BA92}" srcOrd="4" destOrd="0" presId="urn:microsoft.com/office/officeart/2005/8/layout/process1"/>
+    <dgm:cxn modelId="{30EBED9C-1AE3-422B-9ADE-6ABD20D82D77}" type="presParOf" srcId="{38667495-51B7-460C-BF24-D36D2A4EFC73}" destId="{F7B334A7-EDBB-40E7-9F5F-266643AFB6E7}" srcOrd="5" destOrd="0" presId="urn:microsoft.com/office/officeart/2005/8/layout/process1"/>
+    <dgm:cxn modelId="{C9A1BAAA-382E-4438-909D-46695BAD5A75}" type="presParOf" srcId="{F7B334A7-EDBB-40E7-9F5F-266643AFB6E7}" destId="{CAFB0D1D-6A76-4954-96A0-C558FD67FA67}" srcOrd="0" destOrd="0" presId="urn:microsoft.com/office/officeart/2005/8/layout/process1"/>
+    <dgm:cxn modelId="{E1ADE0DE-FDCA-4F33-83F9-758A3D6D6615}" type="presParOf" srcId="{38667495-51B7-460C-BF24-D36D2A4EFC73}" destId="{CBDFCA78-55BF-4D86-A10E-3E0C087C2A27}" srcOrd="6" destOrd="0" presId="urn:microsoft.com/office/officeart/2005/8/layout/process1"/>
+  </dgm:cxnLst>
+  <dgm:bg/>
+  <dgm:whole/>
+  <dgm:extLst>
+    <a:ext uri="http://schemas.microsoft.com/office/drawing/2008/diagram">
+      <dsp:dataModelExt xmlns:dsp="http://schemas.microsoft.com/office/drawing/2008/diagram" relId="rId6" minVer="http://schemas.openxmlformats.org/drawingml/2006/diagram"/>
+    </a:ext>
+  </dgm:extLst>
+</dgm:dataModel>
+</file>
+
+<file path=ppt/diagrams/drawing1.xml><?xml version="1.0" encoding="utf-8"?>
+<dsp:drawing xmlns:dgm="http://schemas.openxmlformats.org/drawingml/2006/diagram" xmlns:dsp="http://schemas.microsoft.com/office/drawing/2008/diagram" xmlns:a="http://schemas.openxmlformats.org/drawingml/2006/main">
+  <dsp:spTree>
+    <dsp:nvGrpSpPr>
+      <dsp:cNvPr id="0" name=""/>
+      <dsp:cNvGrpSpPr/>
+    </dsp:nvGrpSpPr>
+    <dsp:grpSpPr/>
+    <dsp:sp modelId="{559D5182-B416-4240-A858-BA8FEF2C836F}">
+      <dsp:nvSpPr>
+        <dsp:cNvPr id="0" name=""/>
+        <dsp:cNvSpPr/>
+      </dsp:nvSpPr>
+      <dsp:spPr>
+        <a:xfrm>
+          <a:off x="2296" y="859459"/>
+          <a:ext cx="1003952" cy="630607"/>
+        </a:xfrm>
+        <a:prstGeom prst="roundRect">
+          <a:avLst>
+            <a:gd name="adj" fmla="val 10000"/>
+          </a:avLst>
+        </a:prstGeom>
+        <a:solidFill>
+          <a:schemeClr val="accent1">
+            <a:hueOff val="0"/>
+            <a:satOff val="0"/>
+            <a:lumOff val="0"/>
+            <a:alphaOff val="0"/>
+          </a:schemeClr>
+        </a:solidFill>
+        <a:ln w="15875" cap="flat" cmpd="sng" algn="ctr">
+          <a:solidFill>
+            <a:schemeClr val="lt1">
+              <a:hueOff val="0"/>
+              <a:satOff val="0"/>
+              <a:lumOff val="0"/>
+              <a:alphaOff val="0"/>
+            </a:schemeClr>
+          </a:solidFill>
+          <a:prstDash val="solid"/>
+        </a:ln>
+        <a:effectLst/>
+      </dsp:spPr>
+      <dsp:style>
+        <a:lnRef idx="2">
+          <a:scrgbClr r="0" g="0" b="0"/>
+        </a:lnRef>
+        <a:fillRef idx="1">
+          <a:scrgbClr r="0" g="0" b="0"/>
+        </a:fillRef>
+        <a:effectRef idx="0">
+          <a:scrgbClr r="0" g="0" b="0"/>
+        </a:effectRef>
+        <a:fontRef idx="minor">
+          <a:schemeClr val="lt1"/>
+        </a:fontRef>
+      </dsp:style>
+      <dsp:txBody>
+        <a:bodyPr spcFirstLastPara="0" vert="horz" wrap="square" lIns="60960" tIns="60960" rIns="60960" bIns="60960" numCol="1" spcCol="1270" anchor="ctr" anchorCtr="0">
+          <a:noAutofit/>
+        </a:bodyPr>
+        <a:lstStyle/>
+        <a:p>
+          <a:pPr lvl="0" algn="ctr" defTabSz="711200">
+            <a:lnSpc>
+              <a:spcPct val="90000"/>
+            </a:lnSpc>
+            <a:spcBef>
+              <a:spcPct val="0"/>
+            </a:spcBef>
+            <a:spcAft>
+              <a:spcPct val="35000"/>
+            </a:spcAft>
+          </a:pPr>
+          <a:r>
+            <a:rPr lang="en-US" sz="1600" kern="1200" dirty="0" smtClean="0"/>
+            <a:t>Fork</a:t>
+          </a:r>
+          <a:endParaRPr lang="en-US" sz="1600" kern="1200" dirty="0"/>
+        </a:p>
+      </dsp:txBody>
+      <dsp:txXfrm>
+        <a:off x="20766" y="877929"/>
+        <a:ext cx="967012" cy="593667"/>
+      </dsp:txXfrm>
+    </dsp:sp>
+    <dsp:sp modelId="{F9106882-5DBD-417B-9C70-E3D784ECDDEF}">
+      <dsp:nvSpPr>
+        <dsp:cNvPr id="0" name=""/>
+        <dsp:cNvSpPr/>
+      </dsp:nvSpPr>
+      <dsp:spPr>
+        <a:xfrm>
+          <a:off x="1106643" y="1050273"/>
+          <a:ext cx="212837" cy="248980"/>
+        </a:xfrm>
+        <a:prstGeom prst="rightArrow">
+          <a:avLst>
+            <a:gd name="adj1" fmla="val 60000"/>
+            <a:gd name="adj2" fmla="val 50000"/>
+          </a:avLst>
+        </a:prstGeom>
+        <a:solidFill>
+          <a:schemeClr val="accent1">
+            <a:tint val="60000"/>
+            <a:hueOff val="0"/>
+            <a:satOff val="0"/>
+            <a:lumOff val="0"/>
+            <a:alphaOff val="0"/>
+          </a:schemeClr>
+        </a:solidFill>
+        <a:ln>
+          <a:noFill/>
+        </a:ln>
+        <a:effectLst/>
+      </dsp:spPr>
+      <dsp:style>
+        <a:lnRef idx="0">
+          <a:scrgbClr r="0" g="0" b="0"/>
+        </a:lnRef>
+        <a:fillRef idx="1">
+          <a:scrgbClr r="0" g="0" b="0"/>
+        </a:fillRef>
+        <a:effectRef idx="0">
+          <a:scrgbClr r="0" g="0" b="0"/>
+        </a:effectRef>
+        <a:fontRef idx="minor">
+          <a:schemeClr val="lt1"/>
+        </a:fontRef>
+      </dsp:style>
+      <dsp:txBody>
+        <a:bodyPr spcFirstLastPara="0" vert="horz" wrap="square" lIns="0" tIns="0" rIns="0" bIns="0" numCol="1" spcCol="1270" anchor="ctr" anchorCtr="0">
+          <a:noAutofit/>
+        </a:bodyPr>
+        <a:lstStyle/>
+        <a:p>
+          <a:pPr lvl="0" algn="ctr" defTabSz="444500">
+            <a:lnSpc>
+              <a:spcPct val="90000"/>
+            </a:lnSpc>
+            <a:spcBef>
+              <a:spcPct val="0"/>
+            </a:spcBef>
+            <a:spcAft>
+              <a:spcPct val="35000"/>
+            </a:spcAft>
+          </a:pPr>
+          <a:endParaRPr lang="en-US" sz="1000" kern="1200"/>
+        </a:p>
+      </dsp:txBody>
+      <dsp:txXfrm>
+        <a:off x="1106643" y="1100069"/>
+        <a:ext cx="148986" cy="149388"/>
+      </dsp:txXfrm>
+    </dsp:sp>
+    <dsp:sp modelId="{B9E44327-9809-4AB6-8291-20929EFFC5B2}">
+      <dsp:nvSpPr>
+        <dsp:cNvPr id="0" name=""/>
+        <dsp:cNvSpPr/>
+      </dsp:nvSpPr>
+      <dsp:spPr>
+        <a:xfrm>
+          <a:off x="1407829" y="859459"/>
+          <a:ext cx="1003952" cy="630607"/>
+        </a:xfrm>
+        <a:prstGeom prst="roundRect">
+          <a:avLst>
+            <a:gd name="adj" fmla="val 10000"/>
+          </a:avLst>
+        </a:prstGeom>
+        <a:solidFill>
+          <a:schemeClr val="accent1">
+            <a:hueOff val="0"/>
+            <a:satOff val="0"/>
+            <a:lumOff val="0"/>
+            <a:alphaOff val="0"/>
+          </a:schemeClr>
+        </a:solidFill>
+        <a:ln w="15875" cap="flat" cmpd="sng" algn="ctr">
+          <a:solidFill>
+            <a:schemeClr val="lt1">
+              <a:hueOff val="0"/>
+              <a:satOff val="0"/>
+              <a:lumOff val="0"/>
+              <a:alphaOff val="0"/>
+            </a:schemeClr>
+          </a:solidFill>
+          <a:prstDash val="solid"/>
+        </a:ln>
+        <a:effectLst/>
+      </dsp:spPr>
+      <dsp:style>
+        <a:lnRef idx="2">
+          <a:scrgbClr r="0" g="0" b="0"/>
+        </a:lnRef>
+        <a:fillRef idx="1">
+          <a:scrgbClr r="0" g="0" b="0"/>
+        </a:fillRef>
+        <a:effectRef idx="0">
+          <a:scrgbClr r="0" g="0" b="0"/>
+        </a:effectRef>
+        <a:fontRef idx="minor">
+          <a:schemeClr val="lt1"/>
+        </a:fontRef>
+      </dsp:style>
+      <dsp:txBody>
+        <a:bodyPr spcFirstLastPara="0" vert="horz" wrap="square" lIns="60960" tIns="60960" rIns="60960" bIns="60960" numCol="1" spcCol="1270" anchor="ctr" anchorCtr="0">
+          <a:noAutofit/>
+        </a:bodyPr>
+        <a:lstStyle/>
+        <a:p>
+          <a:pPr lvl="0" algn="ctr" defTabSz="711200">
+            <a:lnSpc>
+              <a:spcPct val="90000"/>
+            </a:lnSpc>
+            <a:spcBef>
+              <a:spcPct val="0"/>
+            </a:spcBef>
+            <a:spcAft>
+              <a:spcPct val="35000"/>
+            </a:spcAft>
+          </a:pPr>
+          <a:r>
+            <a:rPr lang="en-US" sz="1600" kern="1200" dirty="0" smtClean="0"/>
+            <a:t>Pull request</a:t>
+          </a:r>
+          <a:endParaRPr lang="en-US" sz="1600" kern="1200" dirty="0"/>
+        </a:p>
+      </dsp:txBody>
+      <dsp:txXfrm>
+        <a:off x="1426299" y="877929"/>
+        <a:ext cx="967012" cy="593667"/>
+      </dsp:txXfrm>
+    </dsp:sp>
+    <dsp:sp modelId="{67E4972E-D8B4-4348-9009-259194C1C3BA}">
+      <dsp:nvSpPr>
+        <dsp:cNvPr id="0" name=""/>
+        <dsp:cNvSpPr/>
+      </dsp:nvSpPr>
+      <dsp:spPr>
+        <a:xfrm>
+          <a:off x="2512176" y="1050273"/>
+          <a:ext cx="212837" cy="248980"/>
+        </a:xfrm>
+        <a:prstGeom prst="rightArrow">
+          <a:avLst>
+            <a:gd name="adj1" fmla="val 60000"/>
+            <a:gd name="adj2" fmla="val 50000"/>
+          </a:avLst>
+        </a:prstGeom>
+        <a:solidFill>
+          <a:schemeClr val="accent1">
+            <a:tint val="60000"/>
+            <a:hueOff val="0"/>
+            <a:satOff val="0"/>
+            <a:lumOff val="0"/>
+            <a:alphaOff val="0"/>
+          </a:schemeClr>
+        </a:solidFill>
+        <a:ln>
+          <a:noFill/>
+        </a:ln>
+        <a:effectLst/>
+      </dsp:spPr>
+      <dsp:style>
+        <a:lnRef idx="0">
+          <a:scrgbClr r="0" g="0" b="0"/>
+        </a:lnRef>
+        <a:fillRef idx="1">
+          <a:scrgbClr r="0" g="0" b="0"/>
+        </a:fillRef>
+        <a:effectRef idx="0">
+          <a:scrgbClr r="0" g="0" b="0"/>
+        </a:effectRef>
+        <a:fontRef idx="minor">
+          <a:schemeClr val="lt1"/>
+        </a:fontRef>
+      </dsp:style>
+      <dsp:txBody>
+        <a:bodyPr spcFirstLastPara="0" vert="horz" wrap="square" lIns="0" tIns="0" rIns="0" bIns="0" numCol="1" spcCol="1270" anchor="ctr" anchorCtr="0">
+          <a:noAutofit/>
+        </a:bodyPr>
+        <a:lstStyle/>
+        <a:p>
+          <a:pPr lvl="0" algn="ctr" defTabSz="444500">
+            <a:lnSpc>
+              <a:spcPct val="90000"/>
+            </a:lnSpc>
+            <a:spcBef>
+              <a:spcPct val="0"/>
+            </a:spcBef>
+            <a:spcAft>
+              <a:spcPct val="35000"/>
+            </a:spcAft>
+          </a:pPr>
+          <a:endParaRPr lang="en-US" sz="1000" kern="1200"/>
+        </a:p>
+      </dsp:txBody>
+      <dsp:txXfrm>
+        <a:off x="2512176" y="1100069"/>
+        <a:ext cx="148986" cy="149388"/>
+      </dsp:txXfrm>
+    </dsp:sp>
+    <dsp:sp modelId="{F1A4EF45-1359-438E-AEFA-F0B45EB9BA92}">
+      <dsp:nvSpPr>
+        <dsp:cNvPr id="0" name=""/>
+        <dsp:cNvSpPr/>
+      </dsp:nvSpPr>
+      <dsp:spPr>
+        <a:xfrm>
+          <a:off x="2813361" y="859459"/>
+          <a:ext cx="1003952" cy="630607"/>
+        </a:xfrm>
+        <a:prstGeom prst="roundRect">
+          <a:avLst>
+            <a:gd name="adj" fmla="val 10000"/>
+          </a:avLst>
+        </a:prstGeom>
+        <a:solidFill>
+          <a:schemeClr val="accent1">
+            <a:hueOff val="0"/>
+            <a:satOff val="0"/>
+            <a:lumOff val="0"/>
+            <a:alphaOff val="0"/>
+          </a:schemeClr>
+        </a:solidFill>
+        <a:ln w="15875" cap="flat" cmpd="sng" algn="ctr">
+          <a:solidFill>
+            <a:schemeClr val="lt1">
+              <a:hueOff val="0"/>
+              <a:satOff val="0"/>
+              <a:lumOff val="0"/>
+              <a:alphaOff val="0"/>
+            </a:schemeClr>
+          </a:solidFill>
+          <a:prstDash val="solid"/>
+        </a:ln>
+        <a:effectLst/>
+      </dsp:spPr>
+      <dsp:style>
+        <a:lnRef idx="2">
+          <a:scrgbClr r="0" g="0" b="0"/>
+        </a:lnRef>
+        <a:fillRef idx="1">
+          <a:scrgbClr r="0" g="0" b="0"/>
+        </a:fillRef>
+        <a:effectRef idx="0">
+          <a:scrgbClr r="0" g="0" b="0"/>
+        </a:effectRef>
+        <a:fontRef idx="minor">
+          <a:schemeClr val="lt1"/>
+        </a:fontRef>
+      </dsp:style>
+      <dsp:txBody>
+        <a:bodyPr spcFirstLastPara="0" vert="horz" wrap="square" lIns="60960" tIns="60960" rIns="60960" bIns="60960" numCol="1" spcCol="1270" anchor="ctr" anchorCtr="0">
+          <a:noAutofit/>
+        </a:bodyPr>
+        <a:lstStyle/>
+        <a:p>
+          <a:pPr lvl="0" algn="ctr" defTabSz="711200">
+            <a:lnSpc>
+              <a:spcPct val="90000"/>
+            </a:lnSpc>
+            <a:spcBef>
+              <a:spcPct val="0"/>
+            </a:spcBef>
+            <a:spcAft>
+              <a:spcPct val="35000"/>
+            </a:spcAft>
+          </a:pPr>
+          <a:r>
+            <a:rPr lang="en-US" sz="1600" kern="1200" dirty="0" err="1" smtClean="0"/>
+            <a:t>Revisão</a:t>
+          </a:r>
+          <a:endParaRPr lang="en-US" sz="1600" kern="1200" dirty="0"/>
+        </a:p>
+      </dsp:txBody>
+      <dsp:txXfrm>
+        <a:off x="2831831" y="877929"/>
+        <a:ext cx="967012" cy="593667"/>
+      </dsp:txXfrm>
+    </dsp:sp>
+    <dsp:sp modelId="{F7B334A7-EDBB-40E7-9F5F-266643AFB6E7}">
+      <dsp:nvSpPr>
+        <dsp:cNvPr id="0" name=""/>
+        <dsp:cNvSpPr/>
+      </dsp:nvSpPr>
+      <dsp:spPr>
+        <a:xfrm rot="21433">
+          <a:off x="3915529" y="1054664"/>
+          <a:ext cx="208225" cy="248980"/>
+        </a:xfrm>
+        <a:prstGeom prst="rightArrow">
+          <a:avLst>
+            <a:gd name="adj1" fmla="val 60000"/>
+            <a:gd name="adj2" fmla="val 50000"/>
+          </a:avLst>
+        </a:prstGeom>
+        <a:solidFill>
+          <a:schemeClr val="accent1">
+            <a:tint val="60000"/>
+            <a:hueOff val="0"/>
+            <a:satOff val="0"/>
+            <a:lumOff val="0"/>
+            <a:alphaOff val="0"/>
+          </a:schemeClr>
+        </a:solidFill>
+        <a:ln>
+          <a:noFill/>
+        </a:ln>
+        <a:effectLst/>
+      </dsp:spPr>
+      <dsp:style>
+        <a:lnRef idx="0">
+          <a:scrgbClr r="0" g="0" b="0"/>
+        </a:lnRef>
+        <a:fillRef idx="1">
+          <a:scrgbClr r="0" g="0" b="0"/>
+        </a:fillRef>
+        <a:effectRef idx="0">
+          <a:scrgbClr r="0" g="0" b="0"/>
+        </a:effectRef>
+        <a:fontRef idx="minor">
+          <a:schemeClr val="lt1"/>
+        </a:fontRef>
+      </dsp:style>
+      <dsp:txBody>
+        <a:bodyPr spcFirstLastPara="0" vert="horz" wrap="square" lIns="0" tIns="0" rIns="0" bIns="0" numCol="1" spcCol="1270" anchor="ctr" anchorCtr="0">
+          <a:noAutofit/>
+        </a:bodyPr>
+        <a:lstStyle/>
+        <a:p>
+          <a:pPr lvl="0" algn="ctr" defTabSz="444500">
+            <a:lnSpc>
+              <a:spcPct val="90000"/>
+            </a:lnSpc>
+            <a:spcBef>
+              <a:spcPct val="0"/>
+            </a:spcBef>
+            <a:spcAft>
+              <a:spcPct val="35000"/>
+            </a:spcAft>
+          </a:pPr>
+          <a:endParaRPr lang="en-US" sz="1000" kern="1200"/>
+        </a:p>
+      </dsp:txBody>
+      <dsp:txXfrm>
+        <a:off x="3915530" y="1104265"/>
+        <a:ext cx="145758" cy="149388"/>
+      </dsp:txXfrm>
+    </dsp:sp>
+    <dsp:sp modelId="{CBDFCA78-55BF-4D86-A10E-3E0C087C2A27}">
+      <dsp:nvSpPr>
+        <dsp:cNvPr id="0" name=""/>
+        <dsp:cNvSpPr/>
+      </dsp:nvSpPr>
+      <dsp:spPr>
+        <a:xfrm>
+          <a:off x="4210184" y="868168"/>
+          <a:ext cx="1003952" cy="630607"/>
+        </a:xfrm>
+        <a:prstGeom prst="roundRect">
+          <a:avLst>
+            <a:gd name="adj" fmla="val 10000"/>
+          </a:avLst>
+        </a:prstGeom>
+        <a:solidFill>
+          <a:schemeClr val="accent1">
+            <a:hueOff val="0"/>
+            <a:satOff val="0"/>
+            <a:lumOff val="0"/>
+            <a:alphaOff val="0"/>
+          </a:schemeClr>
+        </a:solidFill>
+        <a:ln w="15875" cap="flat" cmpd="sng" algn="ctr">
+          <a:solidFill>
+            <a:schemeClr val="lt1">
+              <a:hueOff val="0"/>
+              <a:satOff val="0"/>
+              <a:lumOff val="0"/>
+              <a:alphaOff val="0"/>
+            </a:schemeClr>
+          </a:solidFill>
+          <a:prstDash val="solid"/>
+        </a:ln>
+        <a:effectLst/>
+      </dsp:spPr>
+      <dsp:style>
+        <a:lnRef idx="2">
+          <a:scrgbClr r="0" g="0" b="0"/>
+        </a:lnRef>
+        <a:fillRef idx="1">
+          <a:scrgbClr r="0" g="0" b="0"/>
+        </a:fillRef>
+        <a:effectRef idx="0">
+          <a:scrgbClr r="0" g="0" b="0"/>
+        </a:effectRef>
+        <a:fontRef idx="minor">
+          <a:schemeClr val="lt1"/>
+        </a:fontRef>
+      </dsp:style>
+      <dsp:txBody>
+        <a:bodyPr spcFirstLastPara="0" vert="horz" wrap="square" lIns="60960" tIns="60960" rIns="60960" bIns="60960" numCol="1" spcCol="1270" anchor="ctr" anchorCtr="0">
+          <a:noAutofit/>
+        </a:bodyPr>
+        <a:lstStyle/>
+        <a:p>
+          <a:pPr lvl="0" algn="ctr" defTabSz="711200">
+            <a:lnSpc>
+              <a:spcPct val="90000"/>
+            </a:lnSpc>
+            <a:spcBef>
+              <a:spcPct val="0"/>
+            </a:spcBef>
+            <a:spcAft>
+              <a:spcPct val="35000"/>
+            </a:spcAft>
+          </a:pPr>
+          <a:r>
+            <a:rPr lang="en-US" sz="1600" kern="1200" dirty="0" err="1" smtClean="0"/>
+            <a:t>Aceitação</a:t>
+          </a:r>
+          <a:endParaRPr lang="en-US" sz="1600" kern="1200" dirty="0"/>
+        </a:p>
+      </dsp:txBody>
+      <dsp:txXfrm>
+        <a:off x="4228654" y="886638"/>
+        <a:ext cx="967012" cy="593667"/>
+      </dsp:txXfrm>
+    </dsp:sp>
+  </dsp:spTree>
+</dsp:drawing>
+</file>
+
+<file path=ppt/diagrams/layout1.xml><?xml version="1.0" encoding="utf-8"?>
+<dgm:layoutDef xmlns:dgm="http://schemas.openxmlformats.org/drawingml/2006/diagram" xmlns:a="http://schemas.openxmlformats.org/drawingml/2006/main" uniqueId="urn:microsoft.com/office/officeart/2005/8/layout/process1">
+  <dgm:title val=""/>
+  <dgm:desc val=""/>
+  <dgm:catLst>
+    <dgm:cat type="process" pri="1000"/>
+    <dgm:cat type="convert" pri="15000"/>
+  </dgm:catLst>
+  <dgm:sampData useDef="1">
+    <dgm:dataModel>
+      <dgm:ptLst/>
+      <dgm:bg/>
+      <dgm:whole/>
+    </dgm:dataModel>
+  </dgm:sampData>
+  <dgm:styleData>
+    <dgm:dataModel>
+      <dgm:ptLst>
+        <dgm:pt modelId="0" type="doc"/>
+        <dgm:pt modelId="1"/>
+        <dgm:pt modelId="2"/>
+      </dgm:ptLst>
+      <dgm:cxnLst>
+        <dgm:cxn modelId="3" srcId="0" destId="1" srcOrd="0" destOrd="0"/>
+        <dgm:cxn modelId="4" srcId="0" destId="2" srcOrd="1" destOrd="0"/>
+      </dgm:cxnLst>
+      <dgm:bg/>
+      <dgm:whole/>
+    </dgm:dataModel>
+  </dgm:styleData>
+  <dgm:clrData>
+    <dgm:dataModel>
+      <dgm:ptLst>
+        <dgm:pt modelId="0" type="doc"/>
+        <dgm:pt modelId="1"/>
+        <dgm:pt modelId="2"/>
+        <dgm:pt modelId="3"/>
+        <dgm:pt modelId="4"/>
+      </dgm:ptLst>
+      <dgm:cxnLst>
+        <dgm:cxn modelId="5" srcId="0" destId="1" srcOrd="0" destOrd="0"/>
+        <dgm:cxn modelId="6" srcId="0" destId="2" srcOrd="1" destOrd="0"/>
+        <dgm:cxn modelId="7" srcId="0" destId="3" srcOrd="2" destOrd="0"/>
+        <dgm:cxn modelId="8" srcId="0" destId="4" srcOrd="3" destOrd="0"/>
+      </dgm:cxnLst>
+      <dgm:bg/>
+      <dgm:whole/>
+    </dgm:dataModel>
+  </dgm:clrData>
+  <dgm:layoutNode name="Name0">
+    <dgm:varLst>
+      <dgm:dir/>
+      <dgm:resizeHandles val="exact"/>
+    </dgm:varLst>
+    <dgm:choose name="Name1">
+      <dgm:if name="Name2" func="var" arg="dir" op="equ" val="norm">
+        <dgm:alg type="lin"/>
+      </dgm:if>
+      <dgm:else name="Name3">
+        <dgm:alg type="lin">
+          <dgm:param type="linDir" val="fromR"/>
+        </dgm:alg>
+      </dgm:else>
+    </dgm:choose>
+    <dgm:shape xmlns:r="http://schemas.openxmlformats.org/officeDocument/2006/relationships" r:blip="">
+      <dgm:adjLst/>
+    </dgm:shape>
+    <dgm:presOf/>
+    <dgm:constrLst>
+      <dgm:constr type="w" for="ch" ptType="node" refType="w"/>
+      <dgm:constr type="h" for="ch" ptType="node" op="equ"/>
+      <dgm:constr type="primFontSz" for="ch" ptType="node" op="equ" val="65"/>
+      <dgm:constr type="w" for="ch" ptType="sibTrans" refType="w" refFor="ch" refPtType="node" op="equ" fact="0.4"/>
+      <dgm:constr type="h" for="ch" ptType="sibTrans" op="equ"/>
+      <dgm:constr type="primFontSz" for="des" forName="connectorText" op="equ" val="55"/>
+      <dgm:constr type="primFontSz" for="des" forName="connectorText" refType="primFontSz" refFor="ch" refPtType="node" op="lte" fact="0.8"/>
+    </dgm:constrLst>
+    <dgm:ruleLst/>
+    <dgm:forEach name="nodesForEach" axis="ch" ptType="node">
+      <dgm:layoutNode name="node">
+        <dgm:varLst>
+          <dgm:bulletEnabled val="1"/>
+        </dgm:varLst>
+        <dgm:alg type="tx"/>
+        <dgm:shape xmlns:r="http://schemas.openxmlformats.org/officeDocument/2006/relationships" type="roundRect" r:blip="">
+          <dgm:adjLst>
+            <dgm:adj idx="1" val="0.1"/>
+          </dgm:adjLst>
+        </dgm:shape>
+        <dgm:presOf axis="desOrSelf" ptType="node"/>
+        <dgm:constrLst>
+          <dgm:constr type="h" refType="w" fact="0.6"/>
+          <dgm:constr type="tMarg" refType="primFontSz" fact="0.3"/>
+          <dgm:constr type="bMarg" refType="primFontSz" fact="0.3"/>
+          <dgm:constr type="lMarg" refType="primFontSz" fact="0.3"/>
+          <dgm:constr type="rMarg" refType="primFontSz" fact="0.3"/>
+        </dgm:constrLst>
+        <dgm:ruleLst>
+          <dgm:rule type="primFontSz" val="18" fact="NaN" max="NaN"/>
+          <dgm:rule type="h" val="NaN" fact="1.5" max="NaN"/>
+          <dgm:rule type="primFontSz" val="5" fact="NaN" max="NaN"/>
+          <dgm:rule type="h" val="INF" fact="NaN" max="NaN"/>
+        </dgm:ruleLst>
+      </dgm:layoutNode>
+      <dgm:forEach name="sibTransForEach" axis="followSib" ptType="sibTrans" cnt="1">
+        <dgm:layoutNode name="sibTrans">
+          <dgm:alg type="conn">
+            <dgm:param type="begPts" val="auto"/>
+            <dgm:param type="endPts" val="auto"/>
+          </dgm:alg>
+          <dgm:shape xmlns:r="http://schemas.openxmlformats.org/officeDocument/2006/relationships" type="conn" r:blip="">
+            <dgm:adjLst/>
+          </dgm:shape>
+          <dgm:presOf axis="self"/>
+          <dgm:constrLst>
+            <dgm:constr type="h" refType="w" fact="0.62"/>
+            <dgm:constr type="connDist"/>
+            <dgm:constr type="begPad" refType="connDist" fact="0.25"/>
+            <dgm:constr type="endPad" refType="connDist" fact="0.22"/>
+          </dgm:constrLst>
+          <dgm:ruleLst/>
+          <dgm:layoutNode name="connectorText">
+            <dgm:alg type="tx">
+              <dgm:param type="autoTxRot" val="grav"/>
+            </dgm:alg>
+            <dgm:shape xmlns:r="http://schemas.openxmlformats.org/officeDocument/2006/relationships" type="conn" r:blip="" hideGeom="1">
+              <dgm:adjLst/>
+            </dgm:shape>
+            <dgm:presOf axis="self"/>
+            <dgm:constrLst>
+              <dgm:constr type="lMarg"/>
+              <dgm:constr type="rMarg"/>
+              <dgm:constr type="tMarg"/>
+              <dgm:constr type="bMarg"/>
+            </dgm:constrLst>
+            <dgm:ruleLst>
+              <dgm:rule type="primFontSz" val="5" fact="NaN" max="NaN"/>
+            </dgm:ruleLst>
+          </dgm:layoutNode>
+        </dgm:layoutNode>
+      </dgm:forEach>
+    </dgm:forEach>
+  </dgm:layoutNode>
+</dgm:layoutDef>
+</file>
+
+<file path=ppt/diagrams/quickStyle1.xml><?xml version="1.0" encoding="utf-8"?>
+<dgm:styleDef xmlns:dgm="http://schemas.openxmlformats.org/drawingml/2006/diagram" xmlns:a="http://schemas.openxmlformats.org/drawingml/2006/main" uniqueId="urn:microsoft.com/office/officeart/2005/8/quickstyle/simple1">
+  <dgm:title val=""/>
+  <dgm:desc val=""/>
+  <dgm:catLst>
+    <dgm:cat type="simple" pri="10100"/>
+  </dgm:catLst>
+  <dgm:scene3d>
+    <a:camera prst="orthographicFront"/>
+    <a:lightRig rig="threePt" dir="t"/>
+  </dgm:scene3d>
+  <dgm:styleLbl name="node0">
+    <dgm:scene3d>
+      <a:camera prst="orthographicFront"/>
+      <a:lightRig rig="threePt" dir="t"/>
+    </dgm:scene3d>
+    <dgm:sp3d/>
+    <dgm:txPr/>
+    <dgm:style>
+      <a:lnRef idx="2">
+        <a:scrgbClr r="0" g="0" b="0"/>
+      </a:lnRef>
+      <a:fillRef idx="1">
+        <a:scrgbClr r="0" g="0" b="0"/>
+      </a:fillRef>
+      <a:effectRef idx="0">
+        <a:scrgbClr r="0" g="0" b="0"/>
+      </a:effectRef>
+      <a:fontRef idx="minor">
+        <a:schemeClr val="lt1"/>
+      </a:fontRef>
+    </dgm:style>
+  </dgm:styleLbl>
+  <dgm:styleLbl name="lnNode1">
+    <dgm:scene3d>
+      <a:camera prst="orthographicFront"/>
+      <a:lightRig rig="threePt" dir="t"/>
+    </dgm:scene3d>
+    <dgm:sp3d/>
+    <dgm:txPr/>
+    <dgm:style>
+      <a:lnRef idx="2">
+        <a:scrgbClr r="0" g="0" b="0"/>
+      </a:lnRef>
+      <a:fillRef idx="1">
+        <a:scrgbClr r="0" g="0" b="0"/>
+      </a:fillRef>
+      <a:effectRef idx="0">
+        <a:scrgbClr r="0" g="0" b="0"/>
+      </a:effectRef>
+      <a:fontRef idx="minor">
+        <a:schemeClr val="lt1"/>
+      </a:fontRef>
+    </dgm:style>
+  </dgm:styleLbl>
+  <dgm:styleLbl name="vennNode1">
+    <dgm:scene3d>
+      <a:camera prst="orthographicFront"/>
+      <a:lightRig rig="threePt" dir="t"/>
+    </dgm:scene3d>
+    <dgm:sp3d/>
+    <dgm:txPr/>
+    <dgm:style>
+      <a:lnRef idx="2">
+        <a:scrgbClr r="0" g="0" b="0"/>
+      </a:lnRef>
+      <a:fillRef idx="1">
+        <a:scrgbClr r="0" g="0" b="0"/>
+      </a:fillRef>
+      <a:effectRef idx="0">
+        <a:scrgbClr r="0" g="0" b="0"/>
+      </a:effectRef>
+      <a:fontRef idx="minor">
+        <a:schemeClr val="tx1"/>
+      </a:fontRef>
+    </dgm:style>
+  </dgm:styleLbl>
+  <dgm:styleLbl name="alignNode1">
+    <dgm:scene3d>
+      <a:camera prst="orthographicFront"/>
+      <a:lightRig rig="threePt" dir="t"/>
+    </dgm:scene3d>
+    <dgm:sp3d/>
+    <dgm:txPr/>
+    <dgm:style>
+      <a:lnRef idx="2">
+        <a:scrgbClr r="0" g="0" b="0"/>
+      </a:lnRef>
+      <a:fillRef idx="1">
+        <a:scrgbClr r="0" g="0" b="0"/>
+      </a:fillRef>
+      <a:effectRef idx="0">
+        <a:scrgbClr r="0" g="0" b="0"/>
+      </a:effectRef>
+      <a:fontRef idx="minor">
+        <a:schemeClr val="lt1"/>
+      </a:fontRef>
+    </dgm:style>
+  </dgm:styleLbl>
+  <dgm:styleLbl name="node1">
+    <dgm:scene3d>
+      <a:camera prst="orthographicFront"/>
+      <a:lightRig rig="threePt" dir="t"/>
+    </dgm:scene3d>
+    <dgm:sp3d/>
+    <dgm:txPr/>
+    <dgm:style>
+      <a:lnRef idx="2">
+        <a:scrgbClr r="0" g="0" b="0"/>
+      </a:lnRef>
+      <a:fillRef idx="1">
+        <a:scrgbClr r="0" g="0" b="0"/>
+      </a:fillRef>
+      <a:effectRef idx="0">
+        <a:scrgbClr r="0" g="0" b="0"/>
+      </a:effectRef>
+      <a:fontRef idx="minor">
+        <a:schemeClr val="lt1"/>
+      </a:fontRef>
+    </dgm:style>
+  </dgm:styleLbl>
+  <dgm:styleLbl name="node2">
+    <dgm:scene3d>
+      <a:camera prst="orthographicFront"/>
+      <a:lightRig rig="threePt" dir="t"/>
+    </dgm:scene3d>
+    <dgm:sp3d/>
+    <dgm:txPr/>
+    <dgm:style>
+      <a:lnRef idx="2">
+        <a:scrgbClr r="0" g="0" b="0"/>
+      </a:lnRef>
+      <a:fillRef idx="1">
+        <a:scrgbClr r="0" g="0" b="0"/>
+      </a:fillRef>
+      <a:effectRef idx="0">
+        <a:scrgbClr r="0" g="0" b="0"/>
+      </a:effectRef>
+      <a:fontRef idx="minor">
+        <a:schemeClr val="lt1"/>
+      </a:fontRef>
+    </dgm:style>
+  </dgm:styleLbl>
+  <dgm:styleLbl name="node3">
+    <dgm:scene3d>
+      <a:camera prst="orthographicFront"/>
+      <a:lightRig rig="threePt" dir="t"/>
+    </dgm:scene3d>
+    <dgm:sp3d/>
+    <dgm:txPr/>
+    <dgm:style>
+      <a:lnRef idx="2">
+        <a:scrgbClr r="0" g="0" b="0"/>
+      </a:lnRef>
+      <a:fillRef idx="1">
+        <a:scrgbClr r="0" g="0" b="0"/>
+      </a:fillRef>
+      <a:effectRef idx="0">
+        <a:scrgbClr r="0" g="0" b="0"/>
+      </a:effectRef>
+      <a:fontRef idx="minor">
+        <a:schemeClr val="lt1"/>
+      </a:fontRef>
+    </dgm:style>
+  </dgm:styleLbl>
+  <dgm:styleLbl name="node4">
+    <dgm:scene3d>
+      <a:camera prst="orthographicFront"/>
+      <a:lightRig rig="threePt" dir="t"/>
+    </dgm:scene3d>
+    <dgm:sp3d/>
+    <dgm:txPr/>
+    <dgm:style>
+      <a:lnRef idx="2">
+        <a:scrgbClr r="0" g="0" b="0"/>
+      </a:lnRef>
+      <a:fillRef idx="1">
+        <a:scrgbClr r="0" g="0" b="0"/>
+      </a:fillRef>
+      <a:effectRef idx="0">
+        <a:scrgbClr r="0" g="0" b="0"/>
+      </a:effectRef>
+      <a:fontRef idx="minor">
+        <a:schemeClr val="lt1"/>
+      </a:fontRef>
+    </dgm:style>
+  </dgm:styleLbl>
+  <dgm:styleLbl name="fgImgPlace1">
+    <dgm:scene3d>
+      <a:camera prst="orthographicFront"/>
+      <a:lightRig rig="threePt" dir="t"/>
+    </dgm:scene3d>
+    <dgm:sp3d/>
+    <dgm:txPr/>
+    <dgm:style>
+      <a:lnRef idx="2">
+        <a:scrgbClr r="0" g="0" b="0"/>
+      </a:lnRef>
+      <a:fillRef idx="1">
+        <a:scrgbClr r="0" g="0" b="0"/>
+      </a:fillRef>
+      <a:effectRef idx="0">
+        <a:scrgbClr r="0" g="0" b="0"/>
+      </a:effectRef>
+      <a:fontRef idx="minor"/>
+    </dgm:style>
+  </dgm:styleLbl>
+  <dgm:styleLbl name="alignImgPlace1">
+    <dgm:scene3d>
+      <a:camera prst="orthographicFront"/>
+      <a:lightRig rig="threePt" dir="t"/>
+    </dgm:scene3d>
+    <dgm:sp3d/>
+    <dgm:txPr/>
+    <dgm:style>
+      <a:lnRef idx="2">
+        <a:scrgbClr r="0" g="0" b="0"/>
+      </a:lnRef>
+      <a:fillRef idx="1">
+        <a:scrgbClr r="0" g="0" b="0"/>
+      </a:fillRef>
+      <a:effectRef idx="0">
+        <a:scrgbClr r="0" g="0" b="0"/>
+      </a:effectRef>
+      <a:fontRef idx="minor"/>
+    </dgm:style>
+  </dgm:styleLbl>
+  <dgm:styleLbl name="bgImgPlace1">
+    <dgm:scene3d>
+      <a:camera prst="orthographicFront"/>
+      <a:lightRig rig="threePt" dir="t"/>
+    </dgm:scene3d>
+    <dgm:sp3d/>
+    <dgm:txPr/>
+    <dgm:style>
+      <a:lnRef idx="2">
+        <a:scrgbClr r="0" g="0" b="0"/>
+      </a:lnRef>
+      <a:fillRef idx="1">
+        <a:scrgbClr r="0" g="0" b="0"/>
+      </a:fillRef>
+      <a:effectRef idx="0">
+        <a:scrgbClr r="0" g="0" b="0"/>
+      </a:effectRef>
+      <a:fontRef idx="minor"/>
+    </dgm:style>
+  </dgm:styleLbl>
+  <dgm:styleLbl name="sibTrans2D1">
+    <dgm:scene3d>
+      <a:camera prst="orthographicFront"/>
+      <a:lightRig rig="threePt" dir="t"/>
+    </dgm:scene3d>
+    <dgm:sp3d/>
+    <dgm:txPr/>
+    <dgm:style>
+      <a:lnRef idx="0">
+        <a:scrgbClr r="0" g="0" b="0"/>
+      </a:lnRef>
+      <a:fillRef idx="1">
+        <a:scrgbClr r="0" g="0" b="0"/>
+      </a:fillRef>
+      <a:effectRef idx="0">
+        <a:scrgbClr r="0" g="0" b="0"/>
+      </a:effectRef>
+      <a:fontRef idx="minor">
+        <a:schemeClr val="lt1"/>
+      </a:fontRef>
+    </dgm:style>
+  </dgm:styleLbl>
+  <dgm:styleLbl name="fgSibTrans2D1">
+    <dgm:scene3d>
+      <a:camera prst="orthographicFront"/>
+      <a:lightRig rig="threePt" dir="t"/>
+    </dgm:scene3d>
+    <dgm:sp3d/>
+    <dgm:txPr/>
+    <dgm:style>
+      <a:lnRef idx="0">
+        <a:scrgbClr r="0" g="0" b="0"/>
+      </a:lnRef>
+      <a:fillRef idx="1">
+        <a:scrgbClr r="0" g="0" b="0"/>
+      </a:fillRef>
+      <a:effectRef idx="0">
+        <a:scrgbClr r="0" g="0" b="0"/>
+      </a:effectRef>
+      <a:fontRef idx="minor">
+        <a:schemeClr val="lt1"/>
+      </a:fontRef>
+    </dgm:style>
+  </dgm:styleLbl>
+  <dgm:styleLbl name="bgSibTrans2D1">
+    <dgm:scene3d>
+      <a:camera prst="orthographicFront"/>
+      <a:lightRig rig="threePt" dir="t"/>
+    </dgm:scene3d>
+    <dgm:sp3d/>
+    <dgm:txPr/>
+    <dgm:style>
+      <a:lnRef idx="0">
+        <a:scrgbClr r="0" g="0" b="0"/>
+      </a:lnRef>
+      <a:fillRef idx="1">
+        <a:scrgbClr r="0" g="0" b="0"/>
+      </a:fillRef>
+      <a:effectRef idx="0">
+        <a:scrgbClr r="0" g="0" b="0"/>
+      </a:effectRef>
+      <a:fontRef idx="minor">
+        <a:schemeClr val="lt1"/>
+      </a:fontRef>
+    </dgm:style>
+  </dgm:styleLbl>
+  <dgm:styleLbl name="sibTrans1D1">
+    <dgm:scene3d>
+      <a:camera prst="orthographicFront"/>
+      <a:lightRig rig="threePt" dir="t"/>
+    </dgm:scene3d>
+    <dgm:sp3d/>
+    <dgm:txPr/>
+    <dgm:style>
+      <a:lnRef idx="1">
+        <a:scrgbClr r="0" g="0" b="0"/>
+      </a:lnRef>
+      <a:fillRef idx="0">
+        <a:scrgbClr r="0" g="0" b="0"/>
+      </a:fillRef>
+      <a:effectRef idx="0">
+        <a:scrgbClr r="0" g="0" b="0"/>
+      </a:effectRef>
+      <a:fontRef idx="minor"/>
+    </dgm:style>
+  </dgm:styleLbl>
+  <dgm:styleLbl name="callout">
+    <dgm:scene3d>
+      <a:camera prst="orthographicFront"/>
+      <a:lightRig rig="threePt" dir="t"/>
+    </dgm:scene3d>
+    <dgm:sp3d/>
+    <dgm:txPr/>
+    <dgm:style>
+      <a:lnRef idx="2">
+        <a:scrgbClr r="0" g="0" b="0"/>
+      </a:lnRef>
+      <a:fillRef idx="1">
+        <a:scrgbClr r="0" g="0" b="0"/>
+      </a:fillRef>
+      <a:effectRef idx="0">
+        <a:scrgbClr r="0" g="0" b="0"/>
+      </a:effectRef>
+      <a:fontRef idx="minor"/>
+    </dgm:style>
+  </dgm:styleLbl>
+  <dgm:styleLbl name="asst0">
+    <dgm:scene3d>
+      <a:camera prst="orthographicFront"/>
+      <a:lightRig rig="threePt" dir="t"/>
+    </dgm:scene3d>
+    <dgm:sp3d/>
+    <dgm:txPr/>
+    <dgm:style>
+      <a:lnRef idx="2">
+        <a:scrgbClr r="0" g="0" b="0"/>
+      </a:lnRef>
+      <a:fillRef idx="1">
+        <a:scrgbClr r="0" g="0" b="0"/>
+      </a:fillRef>
+      <a:effectRef idx="0">
+        <a:scrgbClr r="0" g="0" b="0"/>
+      </a:effectRef>
+      <a:fontRef idx="minor">
+        <a:schemeClr val="lt1"/>
+      </a:fontRef>
+    </dgm:style>
+  </dgm:styleLbl>
+  <dgm:styleLbl name="asst1">
+    <dgm:scene3d>
+      <a:camera prst="orthographicFront"/>
+      <a:lightRig rig="threePt" dir="t"/>
+    </dgm:scene3d>
+    <dgm:sp3d/>
+    <dgm:txPr/>
+    <dgm:style>
+      <a:lnRef idx="2">
+        <a:scrgbClr r="0" g="0" b="0"/>
+      </a:lnRef>
+      <a:fillRef idx="1">
+        <a:scrgbClr r="0" g="0" b="0"/>
+      </a:fillRef>
+      <a:effectRef idx="0">
+        <a:scrgbClr r="0" g="0" b="0"/>
+      </a:effectRef>
+      <a:fontRef idx="minor">
+        <a:schemeClr val="lt1"/>
+      </a:fontRef>
+    </dgm:style>
+  </dgm:styleLbl>
+  <dgm:styleLbl name="asst2">
+    <dgm:scene3d>
+      <a:camera prst="orthographicFront"/>
+      <a:lightRig rig="threePt" dir="t"/>
+    </dgm:scene3d>
+    <dgm:sp3d/>
+    <dgm:txPr/>
+    <dgm:style>
+      <a:lnRef idx="2">
+        <a:scrgbClr r="0" g="0" b="0"/>
+      </a:lnRef>
+      <a:fillRef idx="1">
+        <a:scrgbClr r="0" g="0" b="0"/>
+      </a:fillRef>
+      <a:effectRef idx="0">
+        <a:scrgbClr r="0" g="0" b="0"/>
+      </a:effectRef>
+      <a:fontRef idx="minor">
+        <a:schemeClr val="lt1"/>
+      </a:fontRef>
+    </dgm:style>
+  </dgm:styleLbl>
+  <dgm:styleLbl name="asst3">
+    <dgm:scene3d>
+      <a:camera prst="orthographicFront"/>
+      <a:lightRig rig="threePt" dir="t"/>
+    </dgm:scene3d>
+    <dgm:sp3d/>
+    <dgm:txPr/>
+    <dgm:style>
+      <a:lnRef idx="2">
+        <a:scrgbClr r="0" g="0" b="0"/>
+      </a:lnRef>
+      <a:fillRef idx="1">
+        <a:scrgbClr r="0" g="0" b="0"/>
+      </a:fillRef>
+      <a:effectRef idx="0">
+        <a:scrgbClr r="0" g="0" b="0"/>
+      </a:effectRef>
+      <a:fontRef idx="minor">
+        <a:schemeClr val="lt1"/>
+      </a:fontRef>
+    </dgm:style>
+  </dgm:styleLbl>
+  <dgm:styleLbl name="asst4">
+    <dgm:scene3d>
+      <a:camera prst="orthographicFront"/>
+      <a:lightRig rig="threePt" dir="t"/>
+    </dgm:scene3d>
+    <dgm:sp3d/>
+    <dgm:txPr/>
+    <dgm:style>
+      <a:lnRef idx="2">
+        <a:scrgbClr r="0" g="0" b="0"/>
+      </a:lnRef>
+      <a:fillRef idx="1">
+        <a:scrgbClr r="0" g="0" b="0"/>
+      </a:fillRef>
+      <a:effectRef idx="0">
+        <a:scrgbClr r="0" g="0" b="0"/>
+      </a:effectRef>
+      <a:fontRef idx="minor">
+        <a:schemeClr val="lt1"/>
+      </a:fontRef>
+    </dgm:style>
+  </dgm:styleLbl>
+  <dgm:styleLbl name="parChTrans2D1">
+    <dgm:scene3d>
+      <a:camera prst="orthographicFront"/>
+      <a:lightRig rig="threePt" dir="t"/>
+    </dgm:scene3d>
+    <dgm:sp3d/>
+    <dgm:txPr/>
+    <dgm:style>
+      <a:lnRef idx="2">
+        <a:scrgbClr r="0" g="0" b="0"/>
+      </a:lnRef>
+      <a:fillRef idx="1">
+        <a:scrgbClr r="0" g="0" b="0"/>
+      </a:fillRef>
+      <a:effectRef idx="0">
+        <a:scrgbClr r="0" g="0" b="0"/>
+      </a:effectRef>
+      <a:fontRef idx="minor">
+        <a:schemeClr val="lt1"/>
+      </a:fontRef>
+    </dgm:style>
+  </dgm:styleLbl>
+  <dgm:styleLbl name="parChTrans2D2">
+    <dgm:scene3d>
+      <a:camera prst="orthographicFront"/>
+      <a:lightRig rig="threePt" dir="t"/>
+    </dgm:scene3d>
+    <dgm:sp3d/>
+    <dgm:txPr/>
+    <dgm:style>
+      <a:lnRef idx="2">
+        <a:scrgbClr r="0" g="0" b="0"/>
+      </a:lnRef>
+      <a:fillRef idx="1">
+        <a:scrgbClr r="0" g="0" b="0"/>
+      </a:fillRef>
+      <a:effectRef idx="0">
+        <a:scrgbClr r="0" g="0" b="0"/>
+      </a:effectRef>
+      <a:fontRef idx="minor">
+        <a:schemeClr val="lt1"/>
+      </a:fontRef>
+    </dgm:style>
+  </dgm:styleLbl>
+  <dgm:styleLbl name="parChTrans2D3">
+    <dgm:scene3d>
+      <a:camera prst="orthographicFront"/>
+      <a:lightRig rig="threePt" dir="t"/>
+    </dgm:scene3d>
+    <dgm:sp3d/>
+    <dgm:txPr/>
+    <dgm:style>
+      <a:lnRef idx="2">
+        <a:scrgbClr r="0" g="0" b="0"/>
+      </a:lnRef>
+      <a:fillRef idx="1">
+        <a:scrgbClr r="0" g="0" b="0"/>
+      </a:fillRef>
+      <a:effectRef idx="0">
+        <a:scrgbClr r="0" g="0" b="0"/>
+      </a:effectRef>
+      <a:fontRef idx="minor">
+        <a:schemeClr val="lt1"/>
+      </a:fontRef>
+    </dgm:style>
+  </dgm:styleLbl>
+  <dgm:styleLbl name="parChTrans2D4">
+    <dgm:scene3d>
+      <a:camera prst="orthographicFront"/>
+      <a:lightRig rig="threePt" dir="t"/>
+    </dgm:scene3d>
+    <dgm:sp3d/>
+    <dgm:txPr/>
+    <dgm:style>
+      <a:lnRef idx="2">
+        <a:scrgbClr r="0" g="0" b="0"/>
+      </a:lnRef>
+      <a:fillRef idx="1">
+        <a:scrgbClr r="0" g="0" b="0"/>
+      </a:fillRef>
+      <a:effectRef idx="0">
+        <a:scrgbClr r="0" g="0" b="0"/>
+      </a:effectRef>
+      <a:fontRef idx="minor">
+        <a:schemeClr val="lt1"/>
+      </a:fontRef>
+    </dgm:style>
+  </dgm:styleLbl>
+  <dgm:styleLbl name="parChTrans1D1">
+    <dgm:scene3d>
+      <a:camera prst="orthographicFront"/>
+      <a:lightRig rig="threePt" dir="t"/>
+    </dgm:scene3d>
+    <dgm:sp3d/>
+    <dgm:txPr/>
+    <dgm:style>
+      <a:lnRef idx="2">
+        <a:scrgbClr r="0" g="0" b="0"/>
+      </a:lnRef>
+      <a:fillRef idx="0">
+        <a:scrgbClr r="0" g="0" b="0"/>
+      </a:fillRef>
+      <a:effectRef idx="0">
+        <a:scrgbClr r="0" g="0" b="0"/>
+      </a:effectRef>
+      <a:fontRef idx="minor"/>
+    </dgm:style>
+  </dgm:styleLbl>
+  <dgm:styleLbl name="parChTrans1D2">
+    <dgm:scene3d>
+      <a:camera prst="orthographicFront"/>
+      <a:lightRig rig="threePt" dir="t"/>
+    </dgm:scene3d>
+    <dgm:sp3d/>
+    <dgm:txPr/>
+    <dgm:style>
+      <a:lnRef idx="2">
+        <a:scrgbClr r="0" g="0" b="0"/>
+      </a:lnRef>
+      <a:fillRef idx="0">
+        <a:scrgbClr r="0" g="0" b="0"/>
+      </a:fillRef>
+      <a:effectRef idx="0">
+        <a:scrgbClr r="0" g="0" b="0"/>
+      </a:effectRef>
+      <a:fontRef idx="minor"/>
+    </dgm:style>
+  </dgm:styleLbl>
+  <dgm:styleLbl name="parChTrans1D3">
+    <dgm:scene3d>
+      <a:camera prst="orthographicFront"/>
+      <a:lightRig rig="threePt" dir="t"/>
+    </dgm:scene3d>
+    <dgm:sp3d/>
+    <dgm:txPr/>
+    <dgm:style>
+      <a:lnRef idx="2">
+        <a:scrgbClr r="0" g="0" b="0"/>
+      </a:lnRef>
+      <a:fillRef idx="0">
+        <a:scrgbClr r="0" g="0" b="0"/>
+      </a:fillRef>
+      <a:effectRef idx="0">
+        <a:scrgbClr r="0" g="0" b="0"/>
+      </a:effectRef>
+      <a:fontRef idx="minor"/>
+    </dgm:style>
+  </dgm:styleLbl>
+  <dgm:styleLbl name="parChTrans1D4">
+    <dgm:scene3d>
+      <a:camera prst="orthographicFront"/>
+      <a:lightRig rig="threePt" dir="t"/>
+    </dgm:scene3d>
+    <dgm:sp3d/>
+    <dgm:txPr/>
+    <dgm:style>
+      <a:lnRef idx="2">
+        <a:scrgbClr r="0" g="0" b="0"/>
+      </a:lnRef>
+      <a:fillRef idx="0">
+        <a:scrgbClr r="0" g="0" b="0"/>
+      </a:fillRef>
+      <a:effectRef idx="0">
+        <a:scrgbClr r="0" g="0" b="0"/>
+      </a:effectRef>
+      <a:fontRef idx="minor"/>
+    </dgm:style>
+  </dgm:styleLbl>
+  <dgm:styleLbl name="fgAcc1">
+    <dgm:scene3d>
+      <a:camera prst="orthographicFront"/>
+      <a:lightRig rig="threePt" dir="t"/>
+    </dgm:scene3d>
+    <dgm:sp3d/>
+    <dgm:txPr/>
+    <dgm:style>
+      <a:lnRef idx="2">
+        <a:scrgbClr r="0" g="0" b="0"/>
+      </a:lnRef>
+      <a:fillRef idx="1">
+        <a:scrgbClr r="0" g="0" b="0"/>
+      </a:fillRef>
+      <a:effectRef idx="0">
+        <a:scrgbClr r="0" g="0" b="0"/>
+      </a:effectRef>
+      <a:fontRef idx="minor"/>
+    </dgm:style>
+  </dgm:styleLbl>
+  <dgm:styleLbl name="conFgAcc1">
+    <dgm:scene3d>
+      <a:camera prst="orthographicFront"/>
+      <a:lightRig rig="threePt" dir="t"/>
+    </dgm:scene3d>
+    <dgm:sp3d/>
+    <dgm:txPr/>
+    <dgm:style>
+      <a:lnRef idx="2">
+        <a:scrgbClr r="0" g="0" b="0"/>
+      </a:lnRef>
+      <a:fillRef idx="1">
+        <a:scrgbClr r="0" g="0" b="0"/>
+      </a:fillRef>
+      <a:effectRef idx="0">
+        <a:scrgbClr r="0" g="0" b="0"/>
+      </a:effectRef>
+      <a:fontRef idx="minor"/>
+    </dgm:style>
+  </dgm:styleLbl>
+  <dgm:styleLbl name="alignAcc1">
+    <dgm:scene3d>
+      <a:camera prst="orthographicFront"/>
+      <a:lightRig rig="threePt" dir="t"/>
+    </dgm:scene3d>
+    <dgm:sp3d/>
+    <dgm:txPr/>
+    <dgm:style>
+      <a:lnRef idx="2">
+        <a:scrgbClr r="0" g="0" b="0"/>
+      </a:lnRef>
+      <a:fillRef idx="1">
+        <a:scrgbClr r="0" g="0" b="0"/>
+      </a:fillRef>
+      <a:effectRef idx="0">
+        <a:scrgbClr r="0" g="0" b="0"/>
+      </a:effectRef>
+      <a:fontRef idx="minor"/>
+    </dgm:style>
+  </dgm:styleLbl>
+  <dgm:styleLbl name="trAlignAcc1">
+    <dgm:scene3d>
+      <a:camera prst="orthographicFront"/>
+      <a:lightRig rig="threePt" dir="t"/>
+    </dgm:scene3d>
+    <dgm:sp3d/>
+    <dgm:txPr/>
+    <dgm:style>
+      <a:lnRef idx="1">
+        <a:scrgbClr r="0" g="0" b="0"/>
+      </a:lnRef>
+      <a:fillRef idx="1">
+        <a:scrgbClr r="0" g="0" b="0"/>
+      </a:fillRef>
+      <a:effectRef idx="0">
+        <a:scrgbClr r="0" g="0" b="0"/>
+      </a:effectRef>
+      <a:fontRef idx="minor"/>
+    </dgm:style>
+  </dgm:styleLbl>
+  <dgm:styleLbl name="bgAcc1">
+    <dgm:scene3d>
+      <a:camera prst="orthographicFront"/>
+      <a:lightRig rig="threePt" dir="t"/>
+    </dgm:scene3d>
+    <dgm:sp3d/>
+    <dgm:txPr/>
+    <dgm:style>
+      <a:lnRef idx="2">
+        <a:scrgbClr r="0" g="0" b="0"/>
+      </a:lnRef>
+      <a:fillRef idx="1">
+        <a:scrgbClr r="0" g="0" b="0"/>
+      </a:fillRef>
+      <a:effectRef idx="0">
+        <a:scrgbClr r="0" g="0" b="0"/>
+      </a:effectRef>
+      <a:fontRef idx="minor"/>
+    </dgm:style>
+  </dgm:styleLbl>
+  <dgm:styleLbl name="solidFgAcc1">
+    <dgm:scene3d>
+      <a:camera prst="orthographicFront"/>
+      <a:lightRig rig="threePt" dir="t"/>
+    </dgm:scene3d>
+    <dgm:sp3d/>
+    <dgm:txPr/>
+    <dgm:style>
+      <a:lnRef idx="2">
+        <a:scrgbClr r="0" g="0" b="0"/>
+      </a:lnRef>
+      <a:fillRef idx="1">
+        <a:scrgbClr r="0" g="0" b="0"/>
+      </a:fillRef>
+      <a:effectRef idx="0">
+        <a:scrgbClr r="0" g="0" b="0"/>
+      </a:effectRef>
+      <a:fontRef idx="minor"/>
+    </dgm:style>
+  </dgm:styleLbl>
+  <dgm:styleLbl name="solidAlignAcc1">
+    <dgm:scene3d>
+      <a:camera prst="orthographicFront"/>
+      <a:lightRig rig="threePt" dir="t"/>
+    </dgm:scene3d>
+    <dgm:sp3d/>
+    <dgm:txPr/>
+    <dgm:style>
+      <a:lnRef idx="2">
+        <a:scrgbClr r="0" g="0" b="0"/>
+      </a:lnRef>
+      <a:fillRef idx="1">
+        <a:scrgbClr r="0" g="0" b="0"/>
+      </a:fillRef>
+      <a:effectRef idx="0">
+        <a:scrgbClr r="0" g="0" b="0"/>
+      </a:effectRef>
+      <a:fontRef idx="minor"/>
+    </dgm:style>
+  </dgm:styleLbl>
+  <dgm:styleLbl name="solidBgAcc1">
+    <dgm:scene3d>
+      <a:camera prst="orthographicFront"/>
+      <a:lightRig rig="threePt" dir="t"/>
+    </dgm:scene3d>
+    <dgm:sp3d/>
+    <dgm:txPr/>
+    <dgm:style>
+      <a:lnRef idx="2">
+        <a:scrgbClr r="0" g="0" b="0"/>
+      </a:lnRef>
+      <a:fillRef idx="1">
+        <a:scrgbClr r="0" g="0" b="0"/>
+      </a:fillRef>
+      <a:effectRef idx="0">
+        <a:scrgbClr r="0" g="0" b="0"/>
+      </a:effectRef>
+      <a:fontRef idx="minor"/>
+    </dgm:style>
+  </dgm:styleLbl>
+  <dgm:styleLbl name="fgAccFollowNode1">
+    <dgm:scene3d>
+      <a:camera prst="orthographicFront"/>
+      <a:lightRig rig="threePt" dir="t"/>
+    </dgm:scene3d>
+    <dgm:sp3d/>
+    <dgm:txPr/>
+    <dgm:style>
+      <a:lnRef idx="2">
+        <a:scrgbClr r="0" g="0" b="0"/>
+      </a:lnRef>
+      <a:fillRef idx="1">
+        <a:scrgbClr r="0" g="0" b="0"/>
+      </a:fillRef>
+      <a:effectRef idx="0">
+        <a:scrgbClr r="0" g="0" b="0"/>
+      </a:effectRef>
+      <a:fontRef idx="minor"/>
+    </dgm:style>
+  </dgm:styleLbl>
+  <dgm:styleLbl name="alignAccFollowNode1">
+    <dgm:scene3d>
+      <a:camera prst="orthographicFront"/>
+      <a:lightRig rig="threePt" dir="t"/>
+    </dgm:scene3d>
+    <dgm:sp3d/>
+    <dgm:txPr/>
+    <dgm:style>
+      <a:lnRef idx="2">
+        <a:scrgbClr r="0" g="0" b="0"/>
+      </a:lnRef>
+      <a:fillRef idx="1">
+        <a:scrgbClr r="0" g="0" b="0"/>
+      </a:fillRef>
+      <a:effectRef idx="0">
+        <a:scrgbClr r="0" g="0" b="0"/>
+      </a:effectRef>
+      <a:fontRef idx="minor"/>
+    </dgm:style>
+  </dgm:styleLbl>
+  <dgm:styleLbl name="bgAccFollowNode1">
+    <dgm:scene3d>
+      <a:camera prst="orthographicFront"/>
+      <a:lightRig rig="threePt" dir="t"/>
+    </dgm:scene3d>
+    <dgm:sp3d/>
+    <dgm:txPr/>
+    <dgm:style>
+      <a:lnRef idx="2">
+        <a:scrgbClr r="0" g="0" b="0"/>
+      </a:lnRef>
+      <a:fillRef idx="1">
+        <a:scrgbClr r="0" g="0" b="0"/>
+      </a:fillRef>
+      <a:effectRef idx="0">
+        <a:scrgbClr r="0" g="0" b="0"/>
+      </a:effectRef>
+      <a:fontRef idx="minor"/>
+    </dgm:style>
+  </dgm:styleLbl>
+  <dgm:styleLbl name="fgAcc0">
+    <dgm:scene3d>
+      <a:camera prst="orthographicFront"/>
+      <a:lightRig rig="threePt" dir="t"/>
+    </dgm:scene3d>
+    <dgm:sp3d/>
+    <dgm:txPr/>
+    <dgm:style>
+      <a:lnRef idx="2">
+        <a:scrgbClr r="0" g="0" b="0"/>
+      </a:lnRef>
+      <a:fillRef idx="1">
+        <a:scrgbClr r="0" g="0" b="0"/>
+      </a:fillRef>
+      <a:effectRef idx="0">
+        <a:scrgbClr r="0" g="0" b="0"/>
+      </a:effectRef>
+      <a:fontRef idx="minor"/>
+    </dgm:style>
+  </dgm:styleLbl>
+  <dgm:styleLbl name="fgAcc2">
+    <dgm:scene3d>
+      <a:camera prst="orthographicFront"/>
+      <a:lightRig rig="threePt" dir="t"/>
+    </dgm:scene3d>
+    <dgm:sp3d/>
+    <dgm:txPr/>
+    <dgm:style>
+      <a:lnRef idx="2">
+        <a:scrgbClr r="0" g="0" b="0"/>
+      </a:lnRef>
+      <a:fillRef idx="1">
+        <a:scrgbClr r="0" g="0" b="0"/>
+      </a:fillRef>
+      <a:effectRef idx="0">
+        <a:scrgbClr r="0" g="0" b="0"/>
+      </a:effectRef>
+      <a:fontRef idx="minor"/>
+    </dgm:style>
+  </dgm:styleLbl>
+  <dgm:styleLbl name="fgAcc3">
+    <dgm:scene3d>
+      <a:camera prst="orthographicFront"/>
+      <a:lightRig rig="threePt" dir="t"/>
+    </dgm:scene3d>
+    <dgm:sp3d/>
+    <dgm:txPr/>
+    <dgm:style>
+      <a:lnRef idx="2">
+        <a:scrgbClr r="0" g="0" b="0"/>
+      </a:lnRef>
+      <a:fillRef idx="1">
+        <a:scrgbClr r="0" g="0" b="0"/>
+      </a:fillRef>
+      <a:effectRef idx="0">
+        <a:scrgbClr r="0" g="0" b="0"/>
+      </a:effectRef>
+      <a:fontRef idx="minor"/>
+    </dgm:style>
+  </dgm:styleLbl>
+  <dgm:styleLbl name="fgAcc4">
+    <dgm:scene3d>
+      <a:camera prst="orthographicFront"/>
+      <a:lightRig rig="threePt" dir="t"/>
+    </dgm:scene3d>
+    <dgm:sp3d/>
+    <dgm:txPr/>
+    <dgm:style>
+      <a:lnRef idx="2">
+        <a:scrgbClr r="0" g="0" b="0"/>
+      </a:lnRef>
+      <a:fillRef idx="1">
+        <a:scrgbClr r="0" g="0" b="0"/>
+      </a:fillRef>
+      <a:effectRef idx="0">
+        <a:scrgbClr r="0" g="0" b="0"/>
+      </a:effectRef>
+      <a:fontRef idx="minor"/>
+    </dgm:style>
+  </dgm:styleLbl>
+  <dgm:styleLbl name="bgShp">
+    <dgm:scene3d>
+      <a:camera prst="orthographicFront"/>
+      <a:lightRig rig="threePt" dir="t"/>
+    </dgm:scene3d>
+    <dgm:sp3d/>
+    <dgm:txPr/>
+    <dgm:style>
+      <a:lnRef idx="0">
+        <a:scrgbClr r="0" g="0" b="0"/>
+      </a:lnRef>
+      <a:fillRef idx="1">
+        <a:scrgbClr r="0" g="0" b="0"/>
+      </a:fillRef>
+      <a:effectRef idx="0">
+        <a:scrgbClr r="0" g="0" b="0"/>
+      </a:effectRef>
+      <a:fontRef idx="minor"/>
+    </dgm:style>
+  </dgm:styleLbl>
+  <dgm:styleLbl name="dkBgShp">
+    <dgm:scene3d>
+      <a:camera prst="orthographicFront"/>
+      <a:lightRig rig="threePt" dir="t"/>
+    </dgm:scene3d>
+    <dgm:sp3d/>
+    <dgm:txPr/>
+    <dgm:style>
+      <a:lnRef idx="0">
+        <a:scrgbClr r="0" g="0" b="0"/>
+      </a:lnRef>
+      <a:fillRef idx="1">
+        <a:scrgbClr r="0" g="0" b="0"/>
+      </a:fillRef>
+      <a:effectRef idx="0">
+        <a:scrgbClr r="0" g="0" b="0"/>
+      </a:effectRef>
+      <a:fontRef idx="minor"/>
+    </dgm:style>
+  </dgm:styleLbl>
+  <dgm:styleLbl name="trBgShp">
+    <dgm:scene3d>
+      <a:camera prst="orthographicFront"/>
+      <a:lightRig rig="threePt" dir="t"/>
+    </dgm:scene3d>
+    <dgm:sp3d/>
+    <dgm:txPr/>
+    <dgm:style>
+      <a:lnRef idx="0">
+        <a:scrgbClr r="0" g="0" b="0"/>
+      </a:lnRef>
+      <a:fillRef idx="1">
+        <a:scrgbClr r="0" g="0" b="0"/>
+      </a:fillRef>
+      <a:effectRef idx="0">
+        <a:scrgbClr r="0" g="0" b="0"/>
+      </a:effectRef>
+      <a:fontRef idx="minor"/>
+    </dgm:style>
+  </dgm:styleLbl>
+  <dgm:styleLbl name="fgShp">
+    <dgm:scene3d>
+      <a:camera prst="orthographicFront"/>
+      <a:lightRig rig="threePt" dir="t"/>
+    </dgm:scene3d>
+    <dgm:sp3d/>
+    <dgm:txPr/>
+    <dgm:style>
+      <a:lnRef idx="2">
+        <a:scrgbClr r="0" g="0" b="0"/>
+      </a:lnRef>
+      <a:fillRef idx="1">
+        <a:scrgbClr r="0" g="0" b="0"/>
+      </a:fillRef>
+      <a:effectRef idx="0">
+        <a:scrgbClr r="0" g="0" b="0"/>
+      </a:effectRef>
+      <a:fontRef idx="minor"/>
+    </dgm:style>
+  </dgm:styleLbl>
+  <dgm:styleLbl name="revTx">
+    <dgm:scene3d>
+      <a:camera prst="orthographicFront"/>
+      <a:lightRig rig="threePt" dir="t"/>
+    </dgm:scene3d>
+    <dgm:sp3d/>
+    <dgm:txPr/>
+    <dgm:style>
+      <a:lnRef idx="0">
+        <a:scrgbClr r="0" g="0" b="0"/>
+      </a:lnRef>
+      <a:fillRef idx="0">
+        <a:scrgbClr r="0" g="0" b="0"/>
+      </a:fillRef>
+      <a:effectRef idx="0">
+        <a:scrgbClr r="0" g="0" b="0"/>
+      </a:effectRef>
+      <a:fontRef idx="minor"/>
+    </dgm:style>
+  </dgm:styleLbl>
+</dgm:styleDef>
 </file>
 
 <file path=ppt/slideLayouts/slideLayout1.xml><?xml version="1.0" encoding="utf-8"?>
@@ -334,7 +3081,7 @@
           <a:p>
             <a:fld id="{E989FC0A-4060-4C02-AAA1-CFE0D2C98D34}" type="datetimeFigureOut">
               <a:rPr lang="pt-PT" smtClean="0"/>
-              <a:t>12/12/2015</a:t>
+              <a:t>14/12/2015</a:t>
             </a:fld>
             <a:endParaRPr lang="pt-PT"/>
           </a:p>
@@ -542,7 +3289,7 @@
           <a:p>
             <a:fld id="{E989FC0A-4060-4C02-AAA1-CFE0D2C98D34}" type="datetimeFigureOut">
               <a:rPr lang="pt-PT" smtClean="0"/>
-              <a:t>12/12/2015</a:t>
+              <a:t>14/12/2015</a:t>
             </a:fld>
             <a:endParaRPr lang="pt-PT"/>
           </a:p>
@@ -798,7 +3545,7 @@
           <a:p>
             <a:fld id="{E989FC0A-4060-4C02-AAA1-CFE0D2C98D34}" type="datetimeFigureOut">
               <a:rPr lang="pt-PT" smtClean="0"/>
-              <a:t>12/12/2015</a:t>
+              <a:t>14/12/2015</a:t>
             </a:fld>
             <a:endParaRPr lang="pt-PT"/>
           </a:p>
@@ -972,7 +3719,7 @@
           <a:p>
             <a:fld id="{E989FC0A-4060-4C02-AAA1-CFE0D2C98D34}" type="datetimeFigureOut">
               <a:rPr lang="pt-PT" smtClean="0"/>
-              <a:t>12/12/2015</a:t>
+              <a:t>14/12/2015</a:t>
             </a:fld>
             <a:endParaRPr lang="pt-PT"/>
           </a:p>
@@ -1315,7 +4062,7 @@
           <a:p>
             <a:fld id="{E989FC0A-4060-4C02-AAA1-CFE0D2C98D34}" type="datetimeFigureOut">
               <a:rPr lang="pt-PT" smtClean="0"/>
-              <a:t>12/12/2015</a:t>
+              <a:t>14/12/2015</a:t>
             </a:fld>
             <a:endParaRPr lang="pt-PT"/>
           </a:p>
@@ -1590,7 +4337,7 @@
           <a:p>
             <a:fld id="{E989FC0A-4060-4C02-AAA1-CFE0D2C98D34}" type="datetimeFigureOut">
               <a:rPr lang="pt-PT" smtClean="0"/>
-              <a:t>12/12/2015</a:t>
+              <a:t>14/12/2015</a:t>
             </a:fld>
             <a:endParaRPr lang="pt-PT"/>
           </a:p>
@@ -1969,7 +4716,7 @@
           <a:p>
             <a:fld id="{E989FC0A-4060-4C02-AAA1-CFE0D2C98D34}" type="datetimeFigureOut">
               <a:rPr lang="pt-PT" smtClean="0"/>
-              <a:t>12/12/2015</a:t>
+              <a:t>14/12/2015</a:t>
             </a:fld>
             <a:endParaRPr lang="pt-PT"/>
           </a:p>
@@ -2087,7 +4834,7 @@
           <a:p>
             <a:fld id="{E989FC0A-4060-4C02-AAA1-CFE0D2C98D34}" type="datetimeFigureOut">
               <a:rPr lang="pt-PT" smtClean="0"/>
-              <a:t>12/12/2015</a:t>
+              <a:t>14/12/2015</a:t>
             </a:fld>
             <a:endParaRPr lang="pt-PT"/>
           </a:p>
@@ -2258,7 +5005,7 @@
           <a:p>
             <a:fld id="{E989FC0A-4060-4C02-AAA1-CFE0D2C98D34}" type="datetimeFigureOut">
               <a:rPr lang="pt-PT" smtClean="0"/>
-              <a:t>12/12/2015</a:t>
+              <a:t>14/12/2015</a:t>
             </a:fld>
             <a:endParaRPr lang="pt-PT"/>
           </a:p>
@@ -2612,7 +5359,7 @@
           <a:p>
             <a:fld id="{E989FC0A-4060-4C02-AAA1-CFE0D2C98D34}" type="datetimeFigureOut">
               <a:rPr lang="pt-PT" smtClean="0"/>
-              <a:t>12/12/2015</a:t>
+              <a:t>14/12/2015</a:t>
             </a:fld>
             <a:endParaRPr lang="pt-PT"/>
           </a:p>
@@ -2994,7 +5741,7 @@
           <a:p>
             <a:fld id="{E989FC0A-4060-4C02-AAA1-CFE0D2C98D34}" type="datetimeFigureOut">
               <a:rPr lang="pt-PT" smtClean="0"/>
-              <a:t>12/12/2015</a:t>
+              <a:t>14/12/2015</a:t>
             </a:fld>
             <a:endParaRPr lang="pt-PT"/>
           </a:p>
@@ -3281,7 +6028,7 @@
           <a:p>
             <a:fld id="{E989FC0A-4060-4C02-AAA1-CFE0D2C98D34}" type="datetimeFigureOut">
               <a:rPr lang="pt-PT" smtClean="0"/>
-              <a:t>12/12/2015</a:t>
+              <a:t>14/12/2015</a:t>
             </a:fld>
             <a:endParaRPr lang="pt-PT"/>
           </a:p>
@@ -3970,6 +6717,13 @@
   <p:clrMapOvr>
     <a:masterClrMapping/>
   </p:clrMapOvr>
+  <p:timing>
+    <p:tnLst>
+      <p:par>
+        <p:cTn id="1" dur="indefinite" restart="never" nodeType="tmRoot"/>
+      </p:par>
+    </p:tnLst>
+  </p:timing>
 </p:sld>
 </file>
 
@@ -4035,13 +6789,10 @@
           <a:lstStyle/>
           <a:p>
             <a:r>
-              <a:rPr lang="pt-PT" sz="2400" b="1" dirty="0"/>
-              <a:t>Software developing </a:t>
-            </a:r>
-            <a:r>
               <a:rPr lang="pt-PT" sz="2400" b="1" dirty="0" smtClean="0"/>
-              <a:t>process</a:t>
-            </a:r>
+              <a:t>Processo de Desenvolvimento do Software</a:t>
+            </a:r>
+            <a:endParaRPr lang="pt-PT" sz="2400" b="1" dirty="0" smtClean="0"/>
           </a:p>
           <a:p>
             <a:endParaRPr lang="pt-PT" b="1" dirty="0" smtClean="0"/>
@@ -4050,8 +6801,9 @@
             <a:pPr lvl="1"/>
             <a:r>
               <a:rPr lang="pt-PT" b="1" dirty="0" smtClean="0"/>
-              <a:t>Aspired Model</a:t>
-            </a:r>
+              <a:t>Modelo a aplicar</a:t>
+            </a:r>
+            <a:endParaRPr lang="pt-PT" b="1" dirty="0" smtClean="0"/>
           </a:p>
           <a:p>
             <a:pPr lvl="2"/>
@@ -4068,8 +6820,9 @@
             <a:pPr lvl="1"/>
             <a:r>
               <a:rPr lang="pt-PT" b="1" dirty="0" smtClean="0"/>
-              <a:t>Process:</a:t>
-            </a:r>
+              <a:t>Processo</a:t>
+            </a:r>
+            <a:endParaRPr lang="pt-PT" b="1" dirty="0" smtClean="0"/>
           </a:p>
           <a:p>
             <a:pPr lvl="2"/>
@@ -4097,8 +6850,9 @@
             <a:pPr lvl="1"/>
             <a:r>
               <a:rPr lang="pt-PT" b="1" dirty="0" smtClean="0"/>
-              <a:t>Important tools:</a:t>
-            </a:r>
+              <a:t>Ferramentas usadas</a:t>
+            </a:r>
+            <a:endParaRPr lang="pt-PT" b="1" dirty="0" smtClean="0"/>
           </a:p>
           <a:p>
             <a:pPr lvl="2"/>
@@ -4159,49 +6913,148 @@
             </a:r>
             <a:r>
               <a:rPr lang="en-US" dirty="0"/>
-              <a:t> is a game that pays tribute to </a:t>
-            </a:r>
-            <a:r>
-              <a:rPr lang="en-US" i="1" dirty="0" smtClean="0"/>
-              <a:t>Minecraft</a:t>
+              <a:t> </a:t>
             </a:r>
             <a:r>
               <a:rPr lang="en-US" dirty="0" smtClean="0"/>
-              <a:t>. </a:t>
-            </a:r>
-          </a:p>
-          <a:p>
+              <a:t>é um </a:t>
+            </a:r>
+            <a:r>
+              <a:rPr lang="en-US" dirty="0" err="1" smtClean="0"/>
+              <a:t>jogo</a:t>
+            </a:r>
             <a:r>
               <a:rPr lang="en-US" dirty="0" smtClean="0"/>
-              <a:t>Objectives: </a:t>
-            </a:r>
-          </a:p>
-          <a:p>
+              <a:t> de </a:t>
+            </a:r>
+            <a:r>
+              <a:rPr lang="en-US" dirty="0" err="1" smtClean="0"/>
+              <a:t>tributo</a:t>
+            </a:r>
             <a:r>
               <a:rPr lang="en-US" dirty="0" smtClean="0"/>
-              <a:t>        - studying </a:t>
-            </a:r>
-            <a:r>
-              <a:rPr lang="en-US" dirty="0"/>
-              <a:t>the procedures involved in creating 3D </a:t>
+              <a:t> </a:t>
+            </a:r>
+            <a:r>
+              <a:rPr lang="en-US" dirty="0" err="1" smtClean="0"/>
+              <a:t>ao</a:t>
             </a:r>
             <a:r>
               <a:rPr lang="en-US" dirty="0" smtClean="0"/>
-              <a:t>terrain;</a:t>
-            </a:r>
-          </a:p>
-          <a:p>
+              <a:t> Minecraft.</a:t>
+            </a:r>
+            <a:endParaRPr lang="en-US" dirty="0" smtClean="0"/>
+          </a:p>
+          <a:p>
+            <a:r>
+              <a:rPr lang="en-US" dirty="0" err="1" smtClean="0"/>
+              <a:t>Objetivos</a:t>
+            </a:r>
             <a:r>
               <a:rPr lang="en-US" dirty="0" smtClean="0"/>
-              <a:t>        - deepen the knowledge of the </a:t>
-            </a:r>
-            <a:r>
-              <a:rPr lang="en-US" dirty="0"/>
-              <a:t>rendering techniques in Java using the game development </a:t>
-            </a:r>
+              <a:t>: </a:t>
+            </a:r>
+            <a:endParaRPr lang="en-US" dirty="0" smtClean="0"/>
+          </a:p>
+          <a:p>
             <a:r>
               <a:rPr lang="en-US" dirty="0" smtClean="0"/>
-              <a:t>library </a:t>
+              <a:t>        - </a:t>
+            </a:r>
+            <a:r>
+              <a:rPr lang="en-US" dirty="0" err="1" smtClean="0"/>
+              <a:t>estudo</a:t>
+            </a:r>
+            <a:r>
+              <a:rPr lang="en-US" dirty="0" smtClean="0"/>
+              <a:t> da </a:t>
+            </a:r>
+            <a:r>
+              <a:rPr lang="en-US" dirty="0" err="1" smtClean="0"/>
+              <a:t>criação</a:t>
+            </a:r>
+            <a:r>
+              <a:rPr lang="en-US" dirty="0" smtClean="0"/>
+              <a:t> de </a:t>
+            </a:r>
+            <a:r>
+              <a:rPr lang="en-US" dirty="0" err="1" smtClean="0"/>
+              <a:t>terreno</a:t>
+            </a:r>
+            <a:r>
+              <a:rPr lang="en-US" dirty="0" smtClean="0"/>
+              <a:t> 3D;</a:t>
+            </a:r>
+            <a:endParaRPr lang="en-US" dirty="0" smtClean="0"/>
+          </a:p>
+          <a:p>
+            <a:r>
+              <a:rPr lang="en-US" dirty="0" smtClean="0"/>
+              <a:t>        - </a:t>
+            </a:r>
+            <a:r>
+              <a:rPr lang="en-US" dirty="0" err="1" smtClean="0"/>
+              <a:t>aprofundar</a:t>
+            </a:r>
+            <a:r>
+              <a:rPr lang="en-US" dirty="0" smtClean="0"/>
+              <a:t> o </a:t>
+            </a:r>
+            <a:r>
+              <a:rPr lang="en-US" dirty="0" err="1" smtClean="0"/>
+              <a:t>conhecimento</a:t>
+            </a:r>
+            <a:r>
+              <a:rPr lang="en-US" dirty="0" smtClean="0"/>
+              <a:t> das </a:t>
+            </a:r>
+            <a:r>
+              <a:rPr lang="en-US" dirty="0" err="1" smtClean="0"/>
+              <a:t>técnicas</a:t>
+            </a:r>
+            <a:r>
+              <a:rPr lang="en-US" dirty="0" smtClean="0"/>
+              <a:t> de rendering </a:t>
+            </a:r>
+            <a:r>
+              <a:rPr lang="en-US" dirty="0" err="1" smtClean="0"/>
+              <a:t>em</a:t>
+            </a:r>
+            <a:r>
+              <a:rPr lang="en-US" dirty="0" smtClean="0"/>
+              <a:t> Java </a:t>
+            </a:r>
+            <a:r>
+              <a:rPr lang="en-US" dirty="0" err="1" smtClean="0"/>
+              <a:t>usando</a:t>
+            </a:r>
+            <a:r>
+              <a:rPr lang="en-US" dirty="0" smtClean="0"/>
+              <a:t> a </a:t>
+            </a:r>
+            <a:r>
+              <a:rPr lang="en-US" dirty="0" err="1" smtClean="0"/>
+              <a:t>biblioteca</a:t>
+            </a:r>
+            <a:r>
+              <a:rPr lang="en-US" dirty="0" smtClean="0"/>
+              <a:t> de </a:t>
+            </a:r>
+            <a:r>
+              <a:rPr lang="en-US" dirty="0" err="1" smtClean="0"/>
+              <a:t>desenvolvimento</a:t>
+            </a:r>
+            <a:r>
+              <a:rPr lang="en-US" dirty="0" smtClean="0"/>
+              <a:t> de </a:t>
+            </a:r>
+            <a:r>
+              <a:rPr lang="en-US" dirty="0" err="1" smtClean="0"/>
+              <a:t>jogos</a:t>
+            </a:r>
+            <a:r>
+              <a:rPr lang="en-US" dirty="0" smtClean="0"/>
+              <a:t> </a:t>
             </a:r>
             <a:r>
               <a:rPr lang="en-US" b="1" dirty="0" smtClean="0">
@@ -4294,6 +7147,364 @@
   <p:clrMapOvr>
     <a:masterClrMapping/>
   </p:clrMapOvr>
+  <p:timing>
+    <p:tnLst>
+      <p:par>
+        <p:cTn id="1" dur="indefinite" restart="never" nodeType="tmRoot"/>
+      </p:par>
+    </p:tnLst>
+  </p:timing>
+</p:sld>
+</file>
+
+<file path=ppt/slides/slide3.xml><?xml version="1.0" encoding="utf-8"?>
+<p:sld xmlns:a="http://schemas.openxmlformats.org/drawingml/2006/main" xmlns:r="http://schemas.openxmlformats.org/officeDocument/2006/relationships" xmlns:p="http://schemas.openxmlformats.org/presentationml/2006/main">
+  <p:cSld>
+    <p:spTree>
+      <p:nvGrpSpPr>
+        <p:cNvPr id="1" name=""/>
+        <p:cNvGrpSpPr/>
+        <p:nvPr/>
+      </p:nvGrpSpPr>
+      <p:grpSpPr>
+        <a:xfrm>
+          <a:off x="0" y="0"/>
+          <a:ext cx="0" cy="0"/>
+          <a:chOff x="0" y="0"/>
+          <a:chExt cx="0" cy="0"/>
+        </a:xfrm>
+      </p:grpSpPr>
+      <p:sp>
+        <p:nvSpPr>
+          <p:cNvPr id="2" name="Title 1"/>
+          <p:cNvSpPr>
+            <a:spLocks noGrp="1"/>
+          </p:cNvSpPr>
+          <p:nvPr>
+            <p:ph type="title"/>
+          </p:nvPr>
+        </p:nvSpPr>
+        <p:spPr/>
+        <p:txBody>
+          <a:bodyPr/>
+          <a:lstStyle/>
+          <a:p>
+            <a:pPr algn="ctr"/>
+            <a:r>
+              <a:rPr lang="pt-PT" dirty="0" smtClean="0"/>
+              <a:t>Requisitos</a:t>
+            </a:r>
+            <a:endParaRPr lang="pt-PT" dirty="0"/>
+          </a:p>
+        </p:txBody>
+      </p:sp>
+      <p:sp>
+        <p:nvSpPr>
+          <p:cNvPr id="3" name="Content Placeholder 2"/>
+          <p:cNvSpPr>
+            <a:spLocks noGrp="1"/>
+          </p:cNvSpPr>
+          <p:nvPr>
+            <p:ph sz="half" idx="1"/>
+          </p:nvPr>
+        </p:nvSpPr>
+        <p:spPr>
+          <a:xfrm>
+            <a:off x="515363" y="1827836"/>
+            <a:ext cx="4937760" cy="4023360"/>
+          </a:xfrm>
+        </p:spPr>
+        <p:txBody>
+          <a:bodyPr>
+            <a:normAutofit fontScale="92500" lnSpcReduction="10000"/>
+          </a:bodyPr>
+          <a:lstStyle/>
+          <a:p>
+            <a:r>
+              <a:rPr lang="pt-PT" dirty="0" smtClean="0"/>
+              <a:t>Processo:</a:t>
+            </a:r>
+          </a:p>
+          <a:p>
+            <a:pPr lvl="1"/>
+            <a:r>
+              <a:rPr lang="pt-PT" dirty="0" smtClean="0"/>
+              <a:t>1. Sugestão</a:t>
+            </a:r>
+          </a:p>
+          <a:p>
+            <a:pPr lvl="2"/>
+            <a:r>
+              <a:rPr lang="pt-PT" dirty="0" smtClean="0"/>
+              <a:t>Alguém posta uma sugestão na thread respetiva no fórum.</a:t>
+            </a:r>
+          </a:p>
+          <a:p>
+            <a:pPr lvl="1"/>
+            <a:r>
+              <a:rPr lang="pt-PT" dirty="0" smtClean="0"/>
+              <a:t>2. Avaliação</a:t>
+            </a:r>
+          </a:p>
+          <a:p>
+            <a:pPr lvl="2"/>
+            <a:r>
+              <a:rPr lang="pt-PT" dirty="0" smtClean="0"/>
+              <a:t>A sugestão é avaliada por vários membros.</a:t>
+            </a:r>
+          </a:p>
+          <a:p>
+            <a:pPr lvl="1"/>
+            <a:r>
+              <a:rPr lang="pt-PT" dirty="0" smtClean="0"/>
+              <a:t>3. Design</a:t>
+            </a:r>
+          </a:p>
+          <a:p>
+            <a:pPr lvl="2"/>
+            <a:r>
+              <a:rPr lang="pt-PT" dirty="0" smtClean="0"/>
+              <a:t>Começam a ser delineados os aspetos técnicos.</a:t>
+            </a:r>
+          </a:p>
+          <a:p>
+            <a:pPr lvl="1"/>
+            <a:r>
+              <a:rPr lang="pt-PT" dirty="0" smtClean="0"/>
+              <a:t>4. Implementação</a:t>
+            </a:r>
+          </a:p>
+          <a:p>
+            <a:pPr lvl="2"/>
+            <a:r>
+              <a:rPr lang="pt-PT" dirty="0" smtClean="0"/>
+              <a:t>Começa a ser implementada a ideia em código.</a:t>
+            </a:r>
+          </a:p>
+          <a:p>
+            <a:pPr lvl="1"/>
+            <a:r>
+              <a:rPr lang="pt-PT" dirty="0" smtClean="0"/>
+              <a:t>5. Gestão de Módulos</a:t>
+            </a:r>
+          </a:p>
+          <a:p>
+            <a:pPr lvl="2"/>
+            <a:r>
+              <a:rPr lang="pt-PT" dirty="0" smtClean="0"/>
+              <a:t>Avaliar o conceito de forma a decidir qual o objetivo</a:t>
+            </a:r>
+          </a:p>
+          <a:p>
+            <a:pPr lvl="3"/>
+            <a:r>
+              <a:rPr lang="pt-PT" dirty="0" smtClean="0"/>
+              <a:t>Módulo – module forum;</a:t>
+            </a:r>
+          </a:p>
+          <a:p>
+            <a:pPr lvl="3"/>
+            <a:r>
+              <a:rPr lang="pt-PT" dirty="0" smtClean="0"/>
+              <a:t>Arte – art forum;</a:t>
+            </a:r>
+          </a:p>
+          <a:p>
+            <a:pPr lvl="3"/>
+            <a:r>
+              <a:rPr lang="pt-PT" dirty="0" smtClean="0"/>
+              <a:t>Arquitetura – Core Projects forum.</a:t>
+            </a:r>
+          </a:p>
+          <a:p>
+            <a:pPr lvl="1"/>
+            <a:r>
+              <a:rPr lang="pt-PT" dirty="0" smtClean="0"/>
+              <a:t>6. Lançamento</a:t>
+            </a:r>
+          </a:p>
+        </p:txBody>
+      </p:sp>
+      <p:sp>
+        <p:nvSpPr>
+          <p:cNvPr id="4" name="Content Placeholder 3"/>
+          <p:cNvSpPr>
+            <a:spLocks noGrp="1"/>
+          </p:cNvSpPr>
+          <p:nvPr>
+            <p:ph sz="half" idx="2"/>
+          </p:nvPr>
+        </p:nvSpPr>
+        <p:spPr>
+          <a:xfrm>
+            <a:off x="5391279" y="1811196"/>
+            <a:ext cx="4937760" cy="2090538"/>
+          </a:xfrm>
+        </p:spPr>
+        <p:txBody>
+          <a:bodyPr>
+            <a:normAutofit fontScale="92500" lnSpcReduction="10000"/>
+          </a:bodyPr>
+          <a:lstStyle/>
+          <a:p>
+            <a:r>
+              <a:rPr lang="pt-PT" dirty="0" smtClean="0"/>
+              <a:t>Validação:</a:t>
+            </a:r>
+          </a:p>
+          <a:p>
+            <a:endParaRPr lang="pt-PT" dirty="0"/>
+          </a:p>
+          <a:p>
+            <a:endParaRPr lang="pt-PT" dirty="0" smtClean="0"/>
+          </a:p>
+          <a:p>
+            <a:pPr marL="0" indent="0">
+              <a:buNone/>
+            </a:pPr>
+            <a:r>
+              <a:rPr lang="pt-PT" dirty="0" smtClean="0"/>
+              <a:t> Use Cases:</a:t>
+            </a:r>
+          </a:p>
+          <a:p>
+            <a:endParaRPr lang="pt-PT" dirty="0" smtClean="0"/>
+          </a:p>
+          <a:p>
+            <a:pPr lvl="1"/>
+            <a:endParaRPr lang="pt-PT" dirty="0"/>
+          </a:p>
+        </p:txBody>
+      </p:sp>
+      <p:graphicFrame>
+        <p:nvGraphicFramePr>
+          <p:cNvPr id="5" name="Diagram 4"/>
+          <p:cNvGraphicFramePr/>
+          <p:nvPr>
+            <p:extLst>
+              <p:ext uri="{D42A27DB-BD31-4B8C-83A1-F6EECF244321}">
+                <p14:modId xmlns:p14="http://schemas.microsoft.com/office/powerpoint/2010/main" val="3965439288"/>
+              </p:ext>
+            </p:extLst>
+          </p:nvPr>
+        </p:nvGraphicFramePr>
+        <p:xfrm>
+          <a:off x="5721531" y="1401663"/>
+          <a:ext cx="5225143" cy="2349527"/>
+        </p:xfrm>
+        <a:graphic>
+          <a:graphicData uri="http://schemas.openxmlformats.org/drawingml/2006/diagram">
+            <dgm:relIds xmlns:dgm="http://schemas.openxmlformats.org/drawingml/2006/diagram" xmlns:r="http://schemas.openxmlformats.org/officeDocument/2006/relationships" r:dm="rId2" r:lo="rId3" r:qs="rId4" r:cs="rId5"/>
+          </a:graphicData>
+        </a:graphic>
+      </p:graphicFrame>
+      <p:pic>
+        <p:nvPicPr>
+          <p:cNvPr id="6" name="Picture 5"/>
+          <p:cNvPicPr>
+            <a:picLocks noChangeAspect="1"/>
+          </p:cNvPicPr>
+          <p:nvPr/>
+        </p:nvPicPr>
+        <p:blipFill>
+          <a:blip r:embed="rId7">
+            <a:extLst>
+              <a:ext uri="{28A0092B-C50C-407E-A947-70E740481C1C}">
+                <a14:useLocalDpi xmlns:a14="http://schemas.microsoft.com/office/drawing/2010/main" val="0"/>
+              </a:ext>
+            </a:extLst>
+          </a:blip>
+          <a:stretch>
+            <a:fillRect/>
+          </a:stretch>
+        </p:blipFill>
+        <p:spPr>
+          <a:xfrm>
+            <a:off x="5104664" y="3334658"/>
+            <a:ext cx="1767428" cy="1167432"/>
+          </a:xfrm>
+          <a:prstGeom prst="rect">
+            <a:avLst/>
+          </a:prstGeom>
+        </p:spPr>
+      </p:pic>
+      <p:pic>
+        <p:nvPicPr>
+          <p:cNvPr id="7" name="Picture 6"/>
+          <p:cNvPicPr>
+            <a:picLocks noChangeAspect="1"/>
+          </p:cNvPicPr>
+          <p:nvPr/>
+        </p:nvPicPr>
+        <p:blipFill>
+          <a:blip r:embed="rId8">
+            <a:extLst>
+              <a:ext uri="{28A0092B-C50C-407E-A947-70E740481C1C}">
+                <a14:useLocalDpi xmlns:a14="http://schemas.microsoft.com/office/drawing/2010/main" val="0"/>
+              </a:ext>
+            </a:extLst>
+          </a:blip>
+          <a:stretch>
+            <a:fillRect/>
+          </a:stretch>
+        </p:blipFill>
+        <p:spPr>
+          <a:xfrm>
+            <a:off x="6916609" y="3890287"/>
+            <a:ext cx="2321356" cy="1951925"/>
+          </a:xfrm>
+          <a:prstGeom prst="rect">
+            <a:avLst/>
+          </a:prstGeom>
+        </p:spPr>
+      </p:pic>
+      <p:pic>
+        <p:nvPicPr>
+          <p:cNvPr id="8" name="Picture 7"/>
+          <p:cNvPicPr>
+            <a:picLocks noChangeAspect="1"/>
+          </p:cNvPicPr>
+          <p:nvPr/>
+        </p:nvPicPr>
+        <p:blipFill>
+          <a:blip r:embed="rId9">
+            <a:extLst>
+              <a:ext uri="{28A0092B-C50C-407E-A947-70E740481C1C}">
+                <a14:useLocalDpi xmlns:a14="http://schemas.microsoft.com/office/drawing/2010/main" val="0"/>
+              </a:ext>
+            </a:extLst>
+          </a:blip>
+          <a:stretch>
+            <a:fillRect/>
+          </a:stretch>
+        </p:blipFill>
+        <p:spPr>
+          <a:xfrm>
+            <a:off x="9303594" y="3115540"/>
+            <a:ext cx="2711394" cy="2936917"/>
+          </a:xfrm>
+          <a:prstGeom prst="rect">
+            <a:avLst/>
+          </a:prstGeom>
+        </p:spPr>
+      </p:pic>
+    </p:spTree>
+    <p:extLst>
+      <p:ext uri="{BB962C8B-B14F-4D97-AF65-F5344CB8AC3E}">
+        <p14:creationId xmlns:p14="http://schemas.microsoft.com/office/powerpoint/2010/main" val="1627775293"/>
+      </p:ext>
+    </p:extLst>
+  </p:cSld>
+  <p:clrMapOvr>
+    <a:masterClrMapping/>
+  </p:clrMapOvr>
+  <p:timing>
+    <p:tnLst>
+      <p:par>
+        <p:cTn id="1" dur="indefinite" restart="never" nodeType="tmRoot"/>
+      </p:par>
+    </p:tnLst>
+  </p:timing>
 </p:sld>
 </file>
 

</xml_diff>